<commit_message>
init structure for the presentation
</commit_message>
<xml_diff>
--- a/modele_presentation.pptx
+++ b/modele_presentation.pptx
@@ -9,6 +9,8 @@
     <p:sldId id="257" r:id="rId3"/>
     <p:sldId id="258" r:id="rId4"/>
     <p:sldId id="259" r:id="rId5"/>
+    <p:sldId id="260" r:id="rId6"/>
+    <p:sldId id="261" r:id="rId7"/>
   </p:sldIdLst>
   <p:sldSz cx="9144000" cy="5143500" type="screen16x9"/>
   <p:notesSz cx="6858000" cy="9144000"/>
@@ -3118,7 +3120,7 @@
             </a:pPr>
             <a:r>
               <a:rPr/>
-              <a:t>Modele_Presentation</a:t>
+              <a:t>Presentation du Modele</a:t>
             </a:r>
           </a:p>
         </p:txBody>
@@ -3187,7 +3189,12 @@
             <p:ph type="title"/>
           </p:nvPr>
         </p:nvSpPr>
-        <p:spPr/>
+        <p:spPr>
+          <a:xfrm>
+            <a:off x="722313" y="3305176"/>
+            <a:ext cx="7772400" cy="1021556"/>
+          </a:xfrm>
+        </p:spPr>
         <p:txBody>
           <a:bodyPr/>
           <a:lstStyle/>
@@ -3197,42 +3204,7 @@
             </a:pPr>
             <a:r>
               <a:rPr/>
-              <a:t>Quarto</a:t>
-            </a:r>
-          </a:p>
-        </p:txBody>
-      </p:sp>
-      <p:sp>
-        <p:nvSpPr>
-          <p:cNvPr id="3" name="Content Placeholder 2"/>
-          <p:cNvSpPr>
-            <a:spLocks noGrp="1"/>
-          </p:cNvSpPr>
-          <p:nvPr>
-            <p:ph idx="1"/>
-          </p:nvPr>
-        </p:nvSpPr>
-        <p:spPr/>
-        <p:txBody>
-          <a:bodyPr/>
-          <a:lstStyle/>
-          <a:p>
-            <a:pPr lvl="0" indent="0" marL="0">
-              <a:buNone/>
-            </a:pPr>
-            <a:r>
-              <a:rPr/>
-              <a:t>Quarto enables you to weave together content and executable code into a finished presentation. To learn more about Quarto presentations see </a:t>
-            </a:r>
-            <a:r>
-              <a:rPr>
-                <a:hlinkClick r:id="rId2"/>
-              </a:rPr>
-              <a:t>https://quarto.org/docs/presentations/</a:t>
-            </a:r>
-            <a:r>
-              <a:rPr/>
-              <a:t>.</a:t>
+              <a:t>Presentation des donnees</a:t>
             </a:r>
           </a:p>
         </p:txBody>
@@ -3279,7 +3251,7 @@
             </a:pPr>
             <a:r>
               <a:rPr/>
-              <a:t>Bullets</a:t>
+              <a:t>Quarto</a:t>
             </a:r>
           </a:p>
         </p:txBody>
@@ -3304,29 +3276,17 @@
             </a:pPr>
             <a:r>
               <a:rPr/>
-              <a:t>When you click the </a:t>
-            </a:r>
-            <a:r>
-              <a:rPr b="1"/>
-              <a:t>Render</a:t>
+              <a:t>Quarto enables you to weave together content and executable code into a finished presentation. To learn more about Quarto presentations see </a:t>
+            </a:r>
+            <a:r>
+              <a:rPr>
+                <a:hlinkClick r:id="rId2"/>
+              </a:rPr>
+              <a:t>https://quarto.org/docs/presentations/</a:t>
             </a:r>
             <a:r>
               <a:rPr/>
-              <a:t> button a document will be generated that includes:</a:t>
-            </a:r>
-          </a:p>
-          <a:p>
-            <a:pPr lvl="0"/>
-            <a:r>
-              <a:rPr/>
-              <a:t>Content authored with markdown</a:t>
-            </a:r>
-          </a:p>
-          <a:p>
-            <a:pPr lvl="0"/>
-            <a:r>
-              <a:rPr/>
-              <a:t>Output from executable code</a:t>
+              <a:t>.</a:t>
             </a:r>
           </a:p>
         </p:txBody>
@@ -3337,6 +3297,152 @@
 </file>
 
 <file path=ppt/slides/slide4.xml><?xml version="1.0" encoding="utf-8"?>
+<p:sld xmlns:a="http://schemas.openxmlformats.org/drawingml/2006/main" xmlns:r="http://schemas.openxmlformats.org/officeDocument/2006/relationships" xmlns:p="http://schemas.openxmlformats.org/presentationml/2006/main">
+  <p:cSld>
+    <p:spTree>
+      <p:nvGrpSpPr>
+        <p:cNvPr id="1" name=""/>
+        <p:cNvGrpSpPr/>
+        <p:nvPr/>
+      </p:nvGrpSpPr>
+      <p:grpSpPr>
+        <a:xfrm>
+          <a:off x="0" y="0"/>
+          <a:ext cx="0" cy="0"/>
+          <a:chOff x="0" y="0"/>
+          <a:chExt cx="0" cy="0"/>
+        </a:xfrm>
+      </p:grpSpPr>
+      <p:sp>
+        <p:nvSpPr>
+          <p:cNvPr id="2" name="Title 1"/>
+          <p:cNvSpPr>
+            <a:spLocks noGrp="1"/>
+          </p:cNvSpPr>
+          <p:nvPr>
+            <p:ph type="title"/>
+          </p:nvPr>
+        </p:nvSpPr>
+        <p:spPr/>
+        <p:txBody>
+          <a:bodyPr/>
+          <a:lstStyle/>
+          <a:p>
+            <a:pPr lvl="0" indent="0" marL="0">
+              <a:buNone/>
+            </a:pPr>
+            <a:r>
+              <a:rPr/>
+              <a:t>Bullets</a:t>
+            </a:r>
+          </a:p>
+        </p:txBody>
+      </p:sp>
+      <p:sp>
+        <p:nvSpPr>
+          <p:cNvPr id="3" name="Content Placeholder 2"/>
+          <p:cNvSpPr>
+            <a:spLocks noGrp="1"/>
+          </p:cNvSpPr>
+          <p:nvPr>
+            <p:ph idx="1"/>
+          </p:nvPr>
+        </p:nvSpPr>
+        <p:spPr/>
+        <p:txBody>
+          <a:bodyPr/>
+          <a:lstStyle/>
+          <a:p>
+            <a:pPr lvl="0" indent="0" marL="0">
+              <a:buNone/>
+            </a:pPr>
+            <a:r>
+              <a:rPr/>
+              <a:t>When you click the </a:t>
+            </a:r>
+            <a:r>
+              <a:rPr b="1"/>
+              <a:t>Render</a:t>
+            </a:r>
+            <a:r>
+              <a:rPr/>
+              <a:t> button a document will be generated that includes:</a:t>
+            </a:r>
+          </a:p>
+          <a:p>
+            <a:pPr lvl="0"/>
+            <a:r>
+              <a:rPr/>
+              <a:t>Content authored with markdown</a:t>
+            </a:r>
+          </a:p>
+          <a:p>
+            <a:pPr lvl="0"/>
+            <a:r>
+              <a:rPr/>
+              <a:t>Output from executable code</a:t>
+            </a:r>
+          </a:p>
+        </p:txBody>
+      </p:sp>
+    </p:spTree>
+  </p:cSld>
+</p:sld>
+</file>
+
+<file path=ppt/slides/slide5.xml><?xml version="1.0" encoding="utf-8"?>
+<p:sld xmlns:a="http://schemas.openxmlformats.org/drawingml/2006/main" xmlns:r="http://schemas.openxmlformats.org/officeDocument/2006/relationships" xmlns:p="http://schemas.openxmlformats.org/presentationml/2006/main">
+  <p:cSld>
+    <p:spTree>
+      <p:nvGrpSpPr>
+        <p:cNvPr id="1" name=""/>
+        <p:cNvGrpSpPr/>
+        <p:nvPr/>
+      </p:nvGrpSpPr>
+      <p:grpSpPr>
+        <a:xfrm>
+          <a:off x="0" y="0"/>
+          <a:ext cx="0" cy="0"/>
+          <a:chOff x="0" y="0"/>
+          <a:chExt cx="0" cy="0"/>
+        </a:xfrm>
+      </p:grpSpPr>
+      <p:sp>
+        <p:nvSpPr>
+          <p:cNvPr id="2" name="Title 1"/>
+          <p:cNvSpPr>
+            <a:spLocks noGrp="1"/>
+          </p:cNvSpPr>
+          <p:nvPr>
+            <p:ph type="title"/>
+          </p:nvPr>
+        </p:nvSpPr>
+        <p:spPr>
+          <a:xfrm>
+            <a:off x="722313" y="3305176"/>
+            <a:ext cx="7772400" cy="1021556"/>
+          </a:xfrm>
+        </p:spPr>
+        <p:txBody>
+          <a:bodyPr/>
+          <a:lstStyle/>
+          <a:p>
+            <a:pPr lvl="0" indent="0" marL="0">
+              <a:buNone/>
+            </a:pPr>
+            <a:r>
+              <a:rPr/>
+              <a:t>Analyse Descriptive</a:t>
+            </a:r>
+          </a:p>
+        </p:txBody>
+      </p:sp>
+    </p:spTree>
+  </p:cSld>
+</p:sld>
+</file>
+
+<file path=ppt/slides/slide6.xml><?xml version="1.0" encoding="utf-8"?>
 <p:sld xmlns:a="http://schemas.openxmlformats.org/drawingml/2006/main" xmlns:r="http://schemas.openxmlformats.org/officeDocument/2006/relationships" xmlns:p="http://schemas.openxmlformats.org/presentationml/2006/main">
   <p:cSld>
     <p:spTree>

</xml_diff>

<commit_message>
close graphique analysis , onto descriptive
</commit_message>
<xml_diff>
--- a/modele_presentation.pptx
+++ b/modele_presentation.pptx
@@ -14,6 +14,21 @@
     <p:sldId id="262" r:id="rId8"/>
     <p:sldId id="263" r:id="rId9"/>
     <p:sldId id="264" r:id="rId10"/>
+    <p:sldId id="265" r:id="rId11"/>
+    <p:sldId id="266" r:id="rId12"/>
+    <p:sldId id="267" r:id="rId13"/>
+    <p:sldId id="268" r:id="rId14"/>
+    <p:sldId id="269" r:id="rId15"/>
+    <p:sldId id="270" r:id="rId16"/>
+    <p:sldId id="271" r:id="rId17"/>
+    <p:sldId id="272" r:id="rId18"/>
+    <p:sldId id="273" r:id="rId19"/>
+    <p:sldId id="274" r:id="rId20"/>
+    <p:sldId id="275" r:id="rId21"/>
+    <p:sldId id="276" r:id="rId22"/>
+    <p:sldId id="277" r:id="rId23"/>
+    <p:sldId id="278" r:id="rId24"/>
+    <p:sldId id="279" r:id="rId25"/>
   </p:sldIdLst>
   <p:sldSz cx="9144000" cy="5143500" type="screen16x9"/>
   <p:notesSz cx="6858000" cy="9144000"/>
@@ -3165,6 +3180,751 @@
 </p:sld>
 </file>
 
+<file path=ppt/slides/slide10.xml><?xml version="1.0" encoding="utf-8"?>
+<p:sld xmlns:a="http://schemas.openxmlformats.org/drawingml/2006/main" xmlns:r="http://schemas.openxmlformats.org/officeDocument/2006/relationships" xmlns:p="http://schemas.openxmlformats.org/presentationml/2006/main">
+  <p:cSld>
+    <p:spTree>
+      <p:nvGrpSpPr>
+        <p:cNvPr id="1" name=""/>
+        <p:cNvGrpSpPr/>
+        <p:nvPr/>
+      </p:nvGrpSpPr>
+      <p:grpSpPr>
+        <a:xfrm>
+          <a:off x="0" y="0"/>
+          <a:ext cx="0" cy="0"/>
+          <a:chOff x="0" y="0"/>
+          <a:chExt cx="0" cy="0"/>
+        </a:xfrm>
+      </p:grpSpPr>
+      <p:sp>
+        <p:nvSpPr>
+          <p:cNvPr id="2" name="Title 1"/>
+          <p:cNvSpPr>
+            <a:spLocks noGrp="1"/>
+          </p:cNvSpPr>
+          <p:nvPr>
+            <p:ph type="title"/>
+          </p:nvPr>
+        </p:nvSpPr>
+        <p:spPr/>
+        <p:txBody>
+          <a:bodyPr/>
+          <a:lstStyle/>
+          <a:p>
+            <a:pPr lvl="0" indent="0" marL="0">
+              <a:buNone/>
+            </a:pPr>
+            <a:r>
+              <a:rPr/>
+              <a:t>Exportation</a:t>
+            </a:r>
+          </a:p>
+        </p:txBody>
+      </p:sp>
+      <p:pic>
+        <p:nvPicPr>
+          <p:cNvPr descr="modele_presentation_files/figure-pptx/exp%20brut%20plot-1.png" id="0" name="Picture 1"/>
+          <p:cNvPicPr>
+            <a:picLocks noGrp="1" noChangeAspect="1"/>
+          </p:cNvPicPr>
+          <p:nvPr/>
+        </p:nvPicPr>
+        <p:blipFill>
+          <a:blip r:embed="rId2"/>
+          <a:stretch>
+            <a:fillRect/>
+          </a:stretch>
+        </p:blipFill>
+        <p:spPr bwMode="auto">
+          <a:xfrm>
+            <a:off x="1181100" y="1193800"/>
+            <a:ext cx="6781800" cy="3390900"/>
+          </a:xfrm>
+          <a:prstGeom prst="rect">
+            <a:avLst/>
+          </a:prstGeom>
+          <a:noFill/>
+          <a:ln w="9525">
+            <a:noFill/>
+            <a:headEnd/>
+            <a:tailEnd/>
+          </a:ln>
+        </p:spPr>
+      </p:pic>
+    </p:spTree>
+  </p:cSld>
+</p:sld>
+</file>
+
+<file path=ppt/slides/slide11.xml><?xml version="1.0" encoding="utf-8"?>
+<p:sld xmlns:a="http://schemas.openxmlformats.org/drawingml/2006/main" xmlns:r="http://schemas.openxmlformats.org/officeDocument/2006/relationships" xmlns:p="http://schemas.openxmlformats.org/presentationml/2006/main">
+  <p:cSld>
+    <p:spTree>
+      <p:nvGrpSpPr>
+        <p:cNvPr id="1" name=""/>
+        <p:cNvGrpSpPr/>
+        <p:nvPr/>
+      </p:nvGrpSpPr>
+      <p:grpSpPr>
+        <a:xfrm>
+          <a:off x="0" y="0"/>
+          <a:ext cx="0" cy="0"/>
+          <a:chOff x="0" y="0"/>
+          <a:chExt cx="0" cy="0"/>
+        </a:xfrm>
+      </p:grpSpPr>
+      <p:sp>
+        <p:nvSpPr>
+          <p:cNvPr id="2" name="Title 1"/>
+          <p:cNvSpPr>
+            <a:spLocks noGrp="1"/>
+          </p:cNvSpPr>
+          <p:nvPr>
+            <p:ph type="title"/>
+          </p:nvPr>
+        </p:nvSpPr>
+        <p:spPr/>
+        <p:txBody>
+          <a:bodyPr/>
+          <a:lstStyle/>
+          <a:p>
+            <a:pPr lvl="0" indent="0" marL="0">
+              <a:buNone/>
+            </a:pPr>
+            <a:r>
+              <a:rPr/>
+              <a:t>PIB</a:t>
+            </a:r>
+          </a:p>
+        </p:txBody>
+      </p:sp>
+      <p:pic>
+        <p:nvPicPr>
+          <p:cNvPr descr="modele_presentation_files/figure-pptx/pib%20brut%20data%20plot-1.png" id="0" name="Picture 1"/>
+          <p:cNvPicPr>
+            <a:picLocks noGrp="1" noChangeAspect="1"/>
+          </p:cNvPicPr>
+          <p:nvPr/>
+        </p:nvPicPr>
+        <p:blipFill>
+          <a:blip r:embed="rId2"/>
+          <a:stretch>
+            <a:fillRect/>
+          </a:stretch>
+        </p:blipFill>
+        <p:spPr bwMode="auto">
+          <a:xfrm>
+            <a:off x="1181100" y="1193800"/>
+            <a:ext cx="6781800" cy="3390900"/>
+          </a:xfrm>
+          <a:prstGeom prst="rect">
+            <a:avLst/>
+          </a:prstGeom>
+          <a:noFill/>
+          <a:ln w="9525">
+            <a:noFill/>
+            <a:headEnd/>
+            <a:tailEnd/>
+          </a:ln>
+        </p:spPr>
+      </p:pic>
+    </p:spTree>
+  </p:cSld>
+</p:sld>
+</file>
+
+<file path=ppt/slides/slide12.xml><?xml version="1.0" encoding="utf-8"?>
+<p:sld xmlns:a="http://schemas.openxmlformats.org/drawingml/2006/main" xmlns:r="http://schemas.openxmlformats.org/officeDocument/2006/relationships" xmlns:p="http://schemas.openxmlformats.org/presentationml/2006/main">
+  <p:cSld>
+    <p:spTree>
+      <p:nvGrpSpPr>
+        <p:cNvPr id="1" name=""/>
+        <p:cNvGrpSpPr/>
+        <p:nvPr/>
+      </p:nvGrpSpPr>
+      <p:grpSpPr>
+        <a:xfrm>
+          <a:off x="0" y="0"/>
+          <a:ext cx="0" cy="0"/>
+          <a:chOff x="0" y="0"/>
+          <a:chExt cx="0" cy="0"/>
+        </a:xfrm>
+      </p:grpSpPr>
+      <p:sp>
+        <p:nvSpPr>
+          <p:cNvPr id="2" name="Title 1"/>
+          <p:cNvSpPr>
+            <a:spLocks noGrp="1"/>
+          </p:cNvSpPr>
+          <p:nvPr>
+            <p:ph type="title"/>
+          </p:nvPr>
+        </p:nvSpPr>
+        <p:spPr/>
+        <p:txBody>
+          <a:bodyPr/>
+          <a:lstStyle/>
+          <a:p>
+            <a:pPr lvl="0" indent="0" marL="0">
+              <a:buNone/>
+            </a:pPr>
+            <a:r>
+              <a:rPr/>
+              <a:t>PIB USA</a:t>
+            </a:r>
+          </a:p>
+        </p:txBody>
+      </p:sp>
+      <p:pic>
+        <p:nvPicPr>
+          <p:cNvPr descr="modele_presentation_files/figure-pptx/pib.usa%20brut%20plot-1.png" id="0" name="Picture 1"/>
+          <p:cNvPicPr>
+            <a:picLocks noGrp="1" noChangeAspect="1"/>
+          </p:cNvPicPr>
+          <p:nvPr/>
+        </p:nvPicPr>
+        <p:blipFill>
+          <a:blip r:embed="rId2"/>
+          <a:stretch>
+            <a:fillRect/>
+          </a:stretch>
+        </p:blipFill>
+        <p:spPr bwMode="auto">
+          <a:xfrm>
+            <a:off x="1181100" y="1193800"/>
+            <a:ext cx="6781800" cy="3390900"/>
+          </a:xfrm>
+          <a:prstGeom prst="rect">
+            <a:avLst/>
+          </a:prstGeom>
+          <a:noFill/>
+          <a:ln w="9525">
+            <a:noFill/>
+            <a:headEnd/>
+            <a:tailEnd/>
+          </a:ln>
+        </p:spPr>
+      </p:pic>
+    </p:spTree>
+  </p:cSld>
+</p:sld>
+</file>
+
+<file path=ppt/slides/slide13.xml><?xml version="1.0" encoding="utf-8"?>
+<p:sld xmlns:a="http://schemas.openxmlformats.org/drawingml/2006/main" xmlns:r="http://schemas.openxmlformats.org/officeDocument/2006/relationships" xmlns:p="http://schemas.openxmlformats.org/presentationml/2006/main">
+  <p:cSld>
+    <p:spTree>
+      <p:nvGrpSpPr>
+        <p:cNvPr id="1" name=""/>
+        <p:cNvGrpSpPr/>
+        <p:nvPr/>
+      </p:nvGrpSpPr>
+      <p:grpSpPr>
+        <a:xfrm>
+          <a:off x="0" y="0"/>
+          <a:ext cx="0" cy="0"/>
+          <a:chOff x="0" y="0"/>
+          <a:chExt cx="0" cy="0"/>
+        </a:xfrm>
+      </p:grpSpPr>
+      <p:sp>
+        <p:nvSpPr>
+          <p:cNvPr id="2" name="Title 1"/>
+          <p:cNvSpPr>
+            <a:spLocks noGrp="1"/>
+          </p:cNvSpPr>
+          <p:nvPr>
+            <p:ph type="title"/>
+          </p:nvPr>
+        </p:nvSpPr>
+        <p:spPr/>
+        <p:txBody>
+          <a:bodyPr/>
+          <a:lstStyle/>
+          <a:p>
+            <a:pPr lvl="0" indent="0" marL="0">
+              <a:buNone/>
+            </a:pPr>
+            <a:r>
+              <a:rPr/>
+              <a:t>IPc</a:t>
+            </a:r>
+          </a:p>
+        </p:txBody>
+      </p:sp>
+      <p:pic>
+        <p:nvPicPr>
+          <p:cNvPr descr="modele_presentation_files/figure-pptx/ipc%20brut%20plot-1.png" id="0" name="Picture 1"/>
+          <p:cNvPicPr>
+            <a:picLocks noGrp="1" noChangeAspect="1"/>
+          </p:cNvPicPr>
+          <p:nvPr/>
+        </p:nvPicPr>
+        <p:blipFill>
+          <a:blip r:embed="rId2"/>
+          <a:stretch>
+            <a:fillRect/>
+          </a:stretch>
+        </p:blipFill>
+        <p:spPr bwMode="auto">
+          <a:xfrm>
+            <a:off x="1181100" y="1193800"/>
+            <a:ext cx="6781800" cy="3390900"/>
+          </a:xfrm>
+          <a:prstGeom prst="rect">
+            <a:avLst/>
+          </a:prstGeom>
+          <a:noFill/>
+          <a:ln w="9525">
+            <a:noFill/>
+            <a:headEnd/>
+            <a:tailEnd/>
+          </a:ln>
+        </p:spPr>
+      </p:pic>
+    </p:spTree>
+  </p:cSld>
+</p:sld>
+</file>
+
+<file path=ppt/slides/slide14.xml><?xml version="1.0" encoding="utf-8"?>
+<p:sld xmlns:a="http://schemas.openxmlformats.org/drawingml/2006/main" xmlns:r="http://schemas.openxmlformats.org/officeDocument/2006/relationships" xmlns:p="http://schemas.openxmlformats.org/presentationml/2006/main">
+  <p:cSld>
+    <p:spTree>
+      <p:nvGrpSpPr>
+        <p:cNvPr id="1" name=""/>
+        <p:cNvGrpSpPr/>
+        <p:nvPr/>
+      </p:nvGrpSpPr>
+      <p:grpSpPr>
+        <a:xfrm>
+          <a:off x="0" y="0"/>
+          <a:ext cx="0" cy="0"/>
+          <a:chOff x="0" y="0"/>
+          <a:chExt cx="0" cy="0"/>
+        </a:xfrm>
+      </p:grpSpPr>
+      <p:sp>
+        <p:nvSpPr>
+          <p:cNvPr id="2" name="Title 1"/>
+          <p:cNvSpPr>
+            <a:spLocks noGrp="1"/>
+          </p:cNvSpPr>
+          <p:nvPr>
+            <p:ph type="title"/>
+          </p:nvPr>
+        </p:nvSpPr>
+        <p:spPr>
+          <a:xfrm>
+            <a:off x="722313" y="3305176"/>
+            <a:ext cx="7772400" cy="1021556"/>
+          </a:xfrm>
+        </p:spPr>
+        <p:txBody>
+          <a:bodyPr/>
+          <a:lstStyle/>
+          <a:p>
+            <a:pPr lvl="0" indent="0" marL="0">
+              <a:buNone/>
+            </a:pPr>
+            <a:r>
+              <a:rPr/>
+              <a:t>Analyse graphiques evolution des series en Logarithme Neperien allant de 1988 a 2022</a:t>
+            </a:r>
+          </a:p>
+        </p:txBody>
+      </p:sp>
+    </p:spTree>
+  </p:cSld>
+</p:sld>
+</file>
+
+<file path=ppt/slides/slide15.xml><?xml version="1.0" encoding="utf-8"?>
+<p:sld xmlns:a="http://schemas.openxmlformats.org/drawingml/2006/main" xmlns:r="http://schemas.openxmlformats.org/officeDocument/2006/relationships" xmlns:p="http://schemas.openxmlformats.org/presentationml/2006/main">
+  <p:cSld>
+    <p:spTree>
+      <p:nvGrpSpPr>
+        <p:cNvPr id="1" name=""/>
+        <p:cNvGrpSpPr/>
+        <p:nvPr/>
+      </p:nvGrpSpPr>
+      <p:grpSpPr>
+        <a:xfrm>
+          <a:off x="0" y="0"/>
+          <a:ext cx="0" cy="0"/>
+          <a:chOff x="0" y="0"/>
+          <a:chExt cx="0" cy="0"/>
+        </a:xfrm>
+      </p:grpSpPr>
+      <p:sp>
+        <p:nvSpPr>
+          <p:cNvPr id="2" name="Title 1"/>
+          <p:cNvSpPr>
+            <a:spLocks noGrp="1"/>
+          </p:cNvSpPr>
+          <p:nvPr>
+            <p:ph type="title"/>
+          </p:nvPr>
+        </p:nvSpPr>
+        <p:spPr/>
+        <p:txBody>
+          <a:bodyPr/>
+          <a:lstStyle/>
+          <a:p>
+            <a:pPr lvl="0" indent="0" marL="0">
+              <a:buNone/>
+            </a:pPr>
+            <a:r>
+              <a:rPr/>
+              <a:t>Taux de Change</a:t>
+            </a:r>
+          </a:p>
+        </p:txBody>
+      </p:sp>
+      <p:pic>
+        <p:nvPicPr>
+          <p:cNvPr descr="modele_presentation_files/figure-pptx/tx.c%20LN%20plot-1.png" id="0" name="Picture 1"/>
+          <p:cNvPicPr>
+            <a:picLocks noGrp="1" noChangeAspect="1"/>
+          </p:cNvPicPr>
+          <p:nvPr/>
+        </p:nvPicPr>
+        <p:blipFill>
+          <a:blip r:embed="rId2"/>
+          <a:stretch>
+            <a:fillRect/>
+          </a:stretch>
+        </p:blipFill>
+        <p:spPr bwMode="auto">
+          <a:xfrm>
+            <a:off x="1181100" y="1193800"/>
+            <a:ext cx="6781800" cy="3390900"/>
+          </a:xfrm>
+          <a:prstGeom prst="rect">
+            <a:avLst/>
+          </a:prstGeom>
+          <a:noFill/>
+          <a:ln w="9525">
+            <a:noFill/>
+            <a:headEnd/>
+            <a:tailEnd/>
+          </a:ln>
+        </p:spPr>
+      </p:pic>
+    </p:spTree>
+  </p:cSld>
+</p:sld>
+</file>
+
+<file path=ppt/slides/slide16.xml><?xml version="1.0" encoding="utf-8"?>
+<p:sld xmlns:a="http://schemas.openxmlformats.org/drawingml/2006/main" xmlns:r="http://schemas.openxmlformats.org/officeDocument/2006/relationships" xmlns:p="http://schemas.openxmlformats.org/presentationml/2006/main">
+  <p:cSld>
+    <p:spTree>
+      <p:nvGrpSpPr>
+        <p:cNvPr id="1" name=""/>
+        <p:cNvGrpSpPr/>
+        <p:nvPr/>
+      </p:nvGrpSpPr>
+      <p:grpSpPr>
+        <a:xfrm>
+          <a:off x="0" y="0"/>
+          <a:ext cx="0" cy="0"/>
+          <a:chOff x="0" y="0"/>
+          <a:chExt cx="0" cy="0"/>
+        </a:xfrm>
+      </p:grpSpPr>
+      <p:sp>
+        <p:nvSpPr>
+          <p:cNvPr id="2" name="Title 1"/>
+          <p:cNvSpPr>
+            <a:spLocks noGrp="1"/>
+          </p:cNvSpPr>
+          <p:nvPr>
+            <p:ph type="title"/>
+          </p:nvPr>
+        </p:nvSpPr>
+        <p:spPr/>
+        <p:txBody>
+          <a:bodyPr/>
+          <a:lstStyle/>
+          <a:p>
+            <a:pPr lvl="0" indent="0" marL="0">
+              <a:buNone/>
+            </a:pPr>
+            <a:r>
+              <a:rPr/>
+              <a:t>Importation</a:t>
+            </a:r>
+          </a:p>
+        </p:txBody>
+      </p:sp>
+      <p:pic>
+        <p:nvPicPr>
+          <p:cNvPr descr="modele_presentation_files/figure-pptx/Imp%20LN%20plot-1.png" id="0" name="Picture 1"/>
+          <p:cNvPicPr>
+            <a:picLocks noGrp="1" noChangeAspect="1"/>
+          </p:cNvPicPr>
+          <p:nvPr/>
+        </p:nvPicPr>
+        <p:blipFill>
+          <a:blip r:embed="rId2"/>
+          <a:stretch>
+            <a:fillRect/>
+          </a:stretch>
+        </p:blipFill>
+        <p:spPr bwMode="auto">
+          <a:xfrm>
+            <a:off x="1181100" y="1193800"/>
+            <a:ext cx="6781800" cy="3390900"/>
+          </a:xfrm>
+          <a:prstGeom prst="rect">
+            <a:avLst/>
+          </a:prstGeom>
+          <a:noFill/>
+          <a:ln w="9525">
+            <a:noFill/>
+            <a:headEnd/>
+            <a:tailEnd/>
+          </a:ln>
+        </p:spPr>
+      </p:pic>
+    </p:spTree>
+  </p:cSld>
+</p:sld>
+</file>
+
+<file path=ppt/slides/slide17.xml><?xml version="1.0" encoding="utf-8"?>
+<p:sld xmlns:a="http://schemas.openxmlformats.org/drawingml/2006/main" xmlns:r="http://schemas.openxmlformats.org/officeDocument/2006/relationships" xmlns:p="http://schemas.openxmlformats.org/presentationml/2006/main">
+  <p:cSld>
+    <p:spTree>
+      <p:nvGrpSpPr>
+        <p:cNvPr id="1" name=""/>
+        <p:cNvGrpSpPr/>
+        <p:nvPr/>
+      </p:nvGrpSpPr>
+      <p:grpSpPr>
+        <a:xfrm>
+          <a:off x="0" y="0"/>
+          <a:ext cx="0" cy="0"/>
+          <a:chOff x="0" y="0"/>
+          <a:chExt cx="0" cy="0"/>
+        </a:xfrm>
+      </p:grpSpPr>
+      <p:sp>
+        <p:nvSpPr>
+          <p:cNvPr id="2" name="Title 1"/>
+          <p:cNvSpPr>
+            <a:spLocks noGrp="1"/>
+          </p:cNvSpPr>
+          <p:nvPr>
+            <p:ph type="title"/>
+          </p:nvPr>
+        </p:nvSpPr>
+        <p:spPr/>
+        <p:txBody>
+          <a:bodyPr/>
+          <a:lstStyle/>
+          <a:p>
+            <a:pPr lvl="0" indent="0" marL="0">
+              <a:buNone/>
+            </a:pPr>
+            <a:r>
+              <a:rPr/>
+              <a:t>Exportation</a:t>
+            </a:r>
+          </a:p>
+        </p:txBody>
+      </p:sp>
+      <p:pic>
+        <p:nvPicPr>
+          <p:cNvPr descr="modele_presentation_files/figure-pptx/exp%20LN%20plot-1.png" id="0" name="Picture 1"/>
+          <p:cNvPicPr>
+            <a:picLocks noGrp="1" noChangeAspect="1"/>
+          </p:cNvPicPr>
+          <p:nvPr/>
+        </p:nvPicPr>
+        <p:blipFill>
+          <a:blip r:embed="rId2"/>
+          <a:stretch>
+            <a:fillRect/>
+          </a:stretch>
+        </p:blipFill>
+        <p:spPr bwMode="auto">
+          <a:xfrm>
+            <a:off x="1181100" y="1193800"/>
+            <a:ext cx="6781800" cy="3390900"/>
+          </a:xfrm>
+          <a:prstGeom prst="rect">
+            <a:avLst/>
+          </a:prstGeom>
+          <a:noFill/>
+          <a:ln w="9525">
+            <a:noFill/>
+            <a:headEnd/>
+            <a:tailEnd/>
+          </a:ln>
+        </p:spPr>
+      </p:pic>
+    </p:spTree>
+  </p:cSld>
+</p:sld>
+</file>
+
+<file path=ppt/slides/slide18.xml><?xml version="1.0" encoding="utf-8"?>
+<p:sld xmlns:a="http://schemas.openxmlformats.org/drawingml/2006/main" xmlns:r="http://schemas.openxmlformats.org/officeDocument/2006/relationships" xmlns:p="http://schemas.openxmlformats.org/presentationml/2006/main">
+  <p:cSld>
+    <p:spTree>
+      <p:nvGrpSpPr>
+        <p:cNvPr id="1" name=""/>
+        <p:cNvGrpSpPr/>
+        <p:nvPr/>
+      </p:nvGrpSpPr>
+      <p:grpSpPr>
+        <a:xfrm>
+          <a:off x="0" y="0"/>
+          <a:ext cx="0" cy="0"/>
+          <a:chOff x="0" y="0"/>
+          <a:chExt cx="0" cy="0"/>
+        </a:xfrm>
+      </p:grpSpPr>
+      <p:sp>
+        <p:nvSpPr>
+          <p:cNvPr id="2" name="Title 1"/>
+          <p:cNvSpPr>
+            <a:spLocks noGrp="1"/>
+          </p:cNvSpPr>
+          <p:nvPr>
+            <p:ph type="title"/>
+          </p:nvPr>
+        </p:nvSpPr>
+        <p:spPr/>
+        <p:txBody>
+          <a:bodyPr/>
+          <a:lstStyle/>
+          <a:p>
+            <a:pPr lvl="0" indent="0" marL="0">
+              <a:buNone/>
+            </a:pPr>
+            <a:r>
+              <a:rPr/>
+              <a:t>PIB</a:t>
+            </a:r>
+          </a:p>
+        </p:txBody>
+      </p:sp>
+      <p:pic>
+        <p:nvPicPr>
+          <p:cNvPr descr="modele_presentation_files/figure-pptx/pib%20LN%20data%20plot-1.png" id="0" name="Picture 1"/>
+          <p:cNvPicPr>
+            <a:picLocks noGrp="1" noChangeAspect="1"/>
+          </p:cNvPicPr>
+          <p:nvPr/>
+        </p:nvPicPr>
+        <p:blipFill>
+          <a:blip r:embed="rId2"/>
+          <a:stretch>
+            <a:fillRect/>
+          </a:stretch>
+        </p:blipFill>
+        <p:spPr bwMode="auto">
+          <a:xfrm>
+            <a:off x="1181100" y="1193800"/>
+            <a:ext cx="6781800" cy="3390900"/>
+          </a:xfrm>
+          <a:prstGeom prst="rect">
+            <a:avLst/>
+          </a:prstGeom>
+          <a:noFill/>
+          <a:ln w="9525">
+            <a:noFill/>
+            <a:headEnd/>
+            <a:tailEnd/>
+          </a:ln>
+        </p:spPr>
+      </p:pic>
+    </p:spTree>
+  </p:cSld>
+</p:sld>
+</file>
+
+<file path=ppt/slides/slide19.xml><?xml version="1.0" encoding="utf-8"?>
+<p:sld xmlns:a="http://schemas.openxmlformats.org/drawingml/2006/main" xmlns:r="http://schemas.openxmlformats.org/officeDocument/2006/relationships" xmlns:p="http://schemas.openxmlformats.org/presentationml/2006/main">
+  <p:cSld>
+    <p:spTree>
+      <p:nvGrpSpPr>
+        <p:cNvPr id="1" name=""/>
+        <p:cNvGrpSpPr/>
+        <p:nvPr/>
+      </p:nvGrpSpPr>
+      <p:grpSpPr>
+        <a:xfrm>
+          <a:off x="0" y="0"/>
+          <a:ext cx="0" cy="0"/>
+          <a:chOff x="0" y="0"/>
+          <a:chExt cx="0" cy="0"/>
+        </a:xfrm>
+      </p:grpSpPr>
+      <p:sp>
+        <p:nvSpPr>
+          <p:cNvPr id="2" name="Title 1"/>
+          <p:cNvSpPr>
+            <a:spLocks noGrp="1"/>
+          </p:cNvSpPr>
+          <p:nvPr>
+            <p:ph type="title"/>
+          </p:nvPr>
+        </p:nvSpPr>
+        <p:spPr/>
+        <p:txBody>
+          <a:bodyPr/>
+          <a:lstStyle/>
+          <a:p>
+            <a:pPr lvl="0" indent="0" marL="0">
+              <a:buNone/>
+            </a:pPr>
+            <a:r>
+              <a:rPr/>
+              <a:t>PIB USA</a:t>
+            </a:r>
+          </a:p>
+        </p:txBody>
+      </p:sp>
+      <p:pic>
+        <p:nvPicPr>
+          <p:cNvPr descr="modele_presentation_files/figure-pptx/pib.usa%20LN%20plot-1.png" id="0" name="Picture 1"/>
+          <p:cNvPicPr>
+            <a:picLocks noGrp="1" noChangeAspect="1"/>
+          </p:cNvPicPr>
+          <p:nvPr/>
+        </p:nvPicPr>
+        <p:blipFill>
+          <a:blip r:embed="rId2"/>
+          <a:stretch>
+            <a:fillRect/>
+          </a:stretch>
+        </p:blipFill>
+        <p:spPr bwMode="auto">
+          <a:xfrm>
+            <a:off x="1181100" y="1193800"/>
+            <a:ext cx="6781800" cy="3390900"/>
+          </a:xfrm>
+          <a:prstGeom prst="rect">
+            <a:avLst/>
+          </a:prstGeom>
+          <a:noFill/>
+          <a:ln w="9525">
+            <a:noFill/>
+            <a:headEnd/>
+            <a:tailEnd/>
+          </a:ln>
+        </p:spPr>
+      </p:pic>
+    </p:spTree>
+  </p:cSld>
+</p:sld>
+</file>
+
 <file path=ppt/slides/slide2.xml><?xml version="1.0" encoding="utf-8"?>
 <p:sld xmlns:a="http://schemas.openxmlformats.org/drawingml/2006/main" xmlns:r="http://schemas.openxmlformats.org/officeDocument/2006/relationships" xmlns:p="http://schemas.openxmlformats.org/presentationml/2006/main">
   <p:cSld>
@@ -3212,6 +3972,1900 @@
           </a:p>
         </p:txBody>
       </p:sp>
+    </p:spTree>
+  </p:cSld>
+</p:sld>
+</file>
+
+<file path=ppt/slides/slide20.xml><?xml version="1.0" encoding="utf-8"?>
+<p:sld xmlns:a="http://schemas.openxmlformats.org/drawingml/2006/main" xmlns:r="http://schemas.openxmlformats.org/officeDocument/2006/relationships" xmlns:p="http://schemas.openxmlformats.org/presentationml/2006/main">
+  <p:cSld>
+    <p:spTree>
+      <p:nvGrpSpPr>
+        <p:cNvPr id="1" name=""/>
+        <p:cNvGrpSpPr/>
+        <p:nvPr/>
+      </p:nvGrpSpPr>
+      <p:grpSpPr>
+        <a:xfrm>
+          <a:off x="0" y="0"/>
+          <a:ext cx="0" cy="0"/>
+          <a:chOff x="0" y="0"/>
+          <a:chExt cx="0" cy="0"/>
+        </a:xfrm>
+      </p:grpSpPr>
+      <p:sp>
+        <p:nvSpPr>
+          <p:cNvPr id="2" name="Title 1"/>
+          <p:cNvSpPr>
+            <a:spLocks noGrp="1"/>
+          </p:cNvSpPr>
+          <p:nvPr>
+            <p:ph type="title"/>
+          </p:nvPr>
+        </p:nvSpPr>
+        <p:spPr/>
+        <p:txBody>
+          <a:bodyPr/>
+          <a:lstStyle/>
+          <a:p>
+            <a:pPr lvl="0" indent="0" marL="0">
+              <a:buNone/>
+            </a:pPr>
+            <a:r>
+              <a:rPr/>
+              <a:t>IPc</a:t>
+            </a:r>
+          </a:p>
+        </p:txBody>
+      </p:sp>
+      <p:pic>
+        <p:nvPicPr>
+          <p:cNvPr descr="modele_presentation_files/figure-pptx/ipc%20LN%20plot-1.png" id="0" name="Picture 1"/>
+          <p:cNvPicPr>
+            <a:picLocks noGrp="1" noChangeAspect="1"/>
+          </p:cNvPicPr>
+          <p:nvPr/>
+        </p:nvPicPr>
+        <p:blipFill>
+          <a:blip r:embed="rId2"/>
+          <a:stretch>
+            <a:fillRect/>
+          </a:stretch>
+        </p:blipFill>
+        <p:spPr bwMode="auto">
+          <a:xfrm>
+            <a:off x="1181100" y="1193800"/>
+            <a:ext cx="6781800" cy="3390900"/>
+          </a:xfrm>
+          <a:prstGeom prst="rect">
+            <a:avLst/>
+          </a:prstGeom>
+          <a:noFill/>
+          <a:ln w="9525">
+            <a:noFill/>
+            <a:headEnd/>
+            <a:tailEnd/>
+          </a:ln>
+        </p:spPr>
+      </p:pic>
+    </p:spTree>
+  </p:cSld>
+</p:sld>
+</file>
+
+<file path=ppt/slides/slide21.xml><?xml version="1.0" encoding="utf-8"?>
+<p:sld xmlns:a="http://schemas.openxmlformats.org/drawingml/2006/main" xmlns:r="http://schemas.openxmlformats.org/officeDocument/2006/relationships" xmlns:p="http://schemas.openxmlformats.org/presentationml/2006/main">
+  <p:cSld>
+    <p:spTree>
+      <p:nvGrpSpPr>
+        <p:cNvPr id="1" name=""/>
+        <p:cNvGrpSpPr/>
+        <p:nvPr/>
+      </p:nvGrpSpPr>
+      <p:grpSpPr>
+        <a:xfrm>
+          <a:off x="0" y="0"/>
+          <a:ext cx="0" cy="0"/>
+          <a:chOff x="0" y="0"/>
+          <a:chExt cx="0" cy="0"/>
+        </a:xfrm>
+      </p:grpSpPr>
+      <p:sp>
+        <p:nvSpPr>
+          <p:cNvPr id="2" name="Title 1"/>
+          <p:cNvSpPr>
+            <a:spLocks noGrp="1"/>
+          </p:cNvSpPr>
+          <p:nvPr>
+            <p:ph type="title"/>
+          </p:nvPr>
+        </p:nvSpPr>
+        <p:spPr>
+          <a:xfrm>
+            <a:off x="722313" y="3305176"/>
+            <a:ext cx="7772400" cy="1021556"/>
+          </a:xfrm>
+        </p:spPr>
+        <p:txBody>
+          <a:bodyPr/>
+          <a:lstStyle/>
+          <a:p>
+            <a:pPr lvl="0" indent="0" marL="0">
+              <a:buNone/>
+            </a:pPr>
+            <a:r>
+              <a:rPr/>
+              <a:t>Choix de la Transformation en Log des series</a:t>
+            </a:r>
+          </a:p>
+        </p:txBody>
+      </p:sp>
+    </p:spTree>
+  </p:cSld>
+</p:sld>
+</file>
+
+<file path=ppt/slides/slide22.xml><?xml version="1.0" encoding="utf-8"?>
+<p:sld xmlns:a="http://schemas.openxmlformats.org/drawingml/2006/main" xmlns:r="http://schemas.openxmlformats.org/officeDocument/2006/relationships" xmlns:p="http://schemas.openxmlformats.org/presentationml/2006/main">
+  <p:cSld>
+    <p:spTree>
+      <p:nvGrpSpPr>
+        <p:cNvPr id="1" name=""/>
+        <p:cNvGrpSpPr/>
+        <p:nvPr/>
+      </p:nvGrpSpPr>
+      <p:grpSpPr>
+        <a:xfrm>
+          <a:off x="0" y="0"/>
+          <a:ext cx="0" cy="0"/>
+          <a:chOff x="0" y="0"/>
+          <a:chExt cx="0" cy="0"/>
+        </a:xfrm>
+      </p:grpSpPr>
+      <p:sp>
+        <p:nvSpPr>
+          <p:cNvPr id="2" name="Title 1"/>
+          <p:cNvSpPr>
+            <a:spLocks noGrp="1"/>
+          </p:cNvSpPr>
+          <p:nvPr>
+            <p:ph type="title"/>
+          </p:nvPr>
+        </p:nvSpPr>
+        <p:spPr/>
+        <p:txBody>
+          <a:bodyPr/>
+          <a:lstStyle/>
+          <a:p>
+            <a:pPr lvl="0" indent="0" marL="0">
+              <a:buNone/>
+            </a:pPr>
+            <a:r>
+              <a:rPr/>
+              <a:t>Litterature des series en Log</a:t>
+            </a:r>
+          </a:p>
+        </p:txBody>
+      </p:sp>
+      <p:sp>
+        <p:nvSpPr>
+          <p:cNvPr id="3" name="Content Placeholder 2"/>
+          <p:cNvSpPr>
+            <a:spLocks noGrp="1"/>
+          </p:cNvSpPr>
+          <p:nvPr>
+            <p:ph idx="1"/>
+          </p:nvPr>
+        </p:nvSpPr>
+        <p:spPr/>
+        <p:txBody>
+          <a:bodyPr/>
+          <a:lstStyle/>
+          <a:p>
+            <a:pPr lvl="0" indent="0" marL="0">
+              <a:buNone/>
+            </a:pPr>
+            <a:r>
+              <a:rPr/>
+              <a:t>Dans la littérature économétrique sur les séries temporelles, la transformation en logarithme naturel (LN) est souvent utilisée pour plusieurs raisons principales :</a:t>
+            </a:r>
+          </a:p>
+          <a:p>
+            <a:pPr lvl="0" indent="-342900" marL="342900">
+              <a:buAutoNum type="arabicPeriod"/>
+            </a:pPr>
+            <a:r>
+              <a:rPr b="1"/>
+              <a:t>Stabilisation de la variance</a:t>
+            </a:r>
+            <a:r>
+              <a:rPr/>
+              <a:t> : Les séries temporelles peuvent souvent présenter des variations importantes dans leur variance au fil du temps, ce qui peut rendre difficile l’application de techniques statistiques classiques. En prenant le logarithme des valeurs, on réduit généralement l’amplitude des variations de la série, ce qui peut rendre la variance plus stable et faciliter l’analyse.</a:t>
+            </a:r>
+          </a:p>
+          <a:p>
+            <a:pPr lvl="0" indent="-342900" marL="342900">
+              <a:buAutoNum startAt="2" type="arabicPeriod"/>
+            </a:pPr>
+            <a:r>
+              <a:rPr b="1"/>
+              <a:t>Linéarisation des tendances multiplicatives</a:t>
+            </a:r>
+            <a:r>
+              <a:rPr/>
+              <a:t> : Si une série temporelle présente une tendance qui augmente ou diminue de manière exponentielle, prendre le logarithme peut linéariser cette tendance, ce qui permet d’appliquer des modèles linéaires plus simples et plus interprétables. Par exemple, si une série a une croissance exponentielle, la transformation en logarithme peut la transformer en une croissance linéaire.</a:t>
+            </a:r>
+          </a:p>
+          <a:p>
+            <a:pPr lvl="0" indent="-342900" marL="342900">
+              <a:buAutoNum startAt="3" type="arabicPeriod"/>
+            </a:pPr>
+            <a:r>
+              <a:rPr b="1"/>
+              <a:t>Interprétation des variations relatives</a:t>
+            </a:r>
+            <a:r>
+              <a:rPr/>
+              <a:t> : En prenant le logarithme des valeurs, les variations absolues dans les séries temporelles sont transformées en variations relatives, ce qui peut être plus pertinent dans certains contextes économiques. Par exemple, une variation de 0,1 sur une série avec une valeur initiale de 1 aura un effet différent de la même variation sur une série avec une valeur initiale de 100. Les transformations en logarithme permettent de rendre ces variations comparables et plus facilement interprétables.</a:t>
+            </a:r>
+          </a:p>
+          <a:p>
+            <a:pPr lvl="0" indent="-342900" marL="342900">
+              <a:buAutoNum startAt="4" type="arabicPeriod"/>
+            </a:pPr>
+            <a:r>
+              <a:rPr b="1"/>
+              <a:t>Normalisation des distributions</a:t>
+            </a:r>
+            <a:r>
+              <a:rPr/>
+              <a:t> : Dans certains cas, les données peuvent être fortement asymétriques ou présenter des distributions non normales. La transformation en logarithme peut aider à se rapprocher d’une distribution normale, ce qui peut être utile pour l’application de certaines techniques statistiques qui supposent une distribution normale des données.</a:t>
+            </a:r>
+          </a:p>
+          <a:p>
+            <a:pPr lvl="0" indent="0" marL="0">
+              <a:buNone/>
+            </a:pPr>
+            <a:r>
+              <a:rPr/>
+              <a:t>En résumé, les transformations en logarithme sont largement utilisées dans l’analyse des séries temporelles pour stabiliser la variance, linéariser les tendances, faciliter l’interprétation des variations relatives et normaliser les distributions, ce qui rend l’analyse et la modélisation des données plus robustes et interprétables.</a:t>
+            </a:r>
+          </a:p>
+        </p:txBody>
+      </p:sp>
+    </p:spTree>
+  </p:cSld>
+  <p:timing>
+    <p:tnLst>
+      <p:par>
+        <p:cTn id="1" dur="indefinite" restart="never" nodeType="tmRoot">
+          <p:childTnLst>
+            <p:seq concurrent="1" nextAc="seek">
+              <p:cTn id="2" dur="indefinite" nodeType="mainSeq">
+                <p:childTnLst>
+                  <p:par>
+                    <p:cTn id="3" fill="hold">
+                      <p:stCondLst>
+                        <p:cond delay="indefinite"/>
+                      </p:stCondLst>
+                      <p:childTnLst>
+                        <p:par>
+                          <p:cTn id="4" fill="hold">
+                            <p:stCondLst>
+                              <p:cond delay="0"/>
+                            </p:stCondLst>
+                            <p:childTnLst>
+                              <p:par>
+                                <p:cTn id="5" presetID="1" presetClass="entr" presetSubtype="0" fill="hold" grpId="0" nodeType="clickEffect">
+                                  <p:stCondLst>
+                                    <p:cond delay="0"/>
+                                  </p:stCondLst>
+                                  <p:childTnLst>
+                                    <p:set>
+                                      <p:cBhvr>
+                                        <p:cTn id="6" dur="1" fill="hold">
+                                          <p:stCondLst>
+                                            <p:cond delay="0"/>
+                                          </p:stCondLst>
+                                        </p:cTn>
+                                        <p:tgtEl>
+                                          <p:spTgt spid="3">
+                                            <p:txEl>
+                                              <p:pRg st="1" end="1"/>
+                                            </p:txEl>
+                                          </p:spTgt>
+                                        </p:tgtEl>
+                                        <p:attrNameLst>
+                                          <p:attrName>style.visibility</p:attrName>
+                                        </p:attrNameLst>
+                                      </p:cBhvr>
+                                      <p:to>
+                                        <p:strVal val="visible"/>
+                                      </p:to>
+                                    </p:set>
+                                  </p:childTnLst>
+                                </p:cTn>
+                              </p:par>
+                            </p:childTnLst>
+                          </p:cTn>
+                        </p:par>
+                      </p:childTnLst>
+                    </p:cTn>
+                  </p:par>
+                  <p:par>
+                    <p:cTn id="7" fill="hold">
+                      <p:stCondLst>
+                        <p:cond delay="indefinite"/>
+                      </p:stCondLst>
+                      <p:childTnLst>
+                        <p:par>
+                          <p:cTn id="8" fill="hold">
+                            <p:stCondLst>
+                              <p:cond delay="0"/>
+                            </p:stCondLst>
+                            <p:childTnLst>
+                              <p:par>
+                                <p:cTn id="9" presetID="1" presetClass="entr" presetSubtype="0" fill="hold" grpId="0" nodeType="clickEffect">
+                                  <p:stCondLst>
+                                    <p:cond delay="0"/>
+                                  </p:stCondLst>
+                                  <p:childTnLst>
+                                    <p:set>
+                                      <p:cBhvr>
+                                        <p:cTn id="10" dur="1" fill="hold">
+                                          <p:stCondLst>
+                                            <p:cond delay="0"/>
+                                          </p:stCondLst>
+                                        </p:cTn>
+                                        <p:tgtEl>
+                                          <p:spTgt spid="3">
+                                            <p:txEl>
+                                              <p:pRg st="2" end="2"/>
+                                            </p:txEl>
+                                          </p:spTgt>
+                                        </p:tgtEl>
+                                        <p:attrNameLst>
+                                          <p:attrName>style.visibility</p:attrName>
+                                        </p:attrNameLst>
+                                      </p:cBhvr>
+                                      <p:to>
+                                        <p:strVal val="visible"/>
+                                      </p:to>
+                                    </p:set>
+                                  </p:childTnLst>
+                                </p:cTn>
+                              </p:par>
+                            </p:childTnLst>
+                          </p:cTn>
+                        </p:par>
+                      </p:childTnLst>
+                    </p:cTn>
+                  </p:par>
+                  <p:par>
+                    <p:cTn id="11" fill="hold">
+                      <p:stCondLst>
+                        <p:cond delay="indefinite"/>
+                      </p:stCondLst>
+                      <p:childTnLst>
+                        <p:par>
+                          <p:cTn id="12" fill="hold">
+                            <p:stCondLst>
+                              <p:cond delay="0"/>
+                            </p:stCondLst>
+                            <p:childTnLst>
+                              <p:par>
+                                <p:cTn id="13" presetID="1" presetClass="entr" presetSubtype="0" fill="hold" grpId="0" nodeType="clickEffect">
+                                  <p:stCondLst>
+                                    <p:cond delay="0"/>
+                                  </p:stCondLst>
+                                  <p:childTnLst>
+                                    <p:set>
+                                      <p:cBhvr>
+                                        <p:cTn id="14" dur="1" fill="hold">
+                                          <p:stCondLst>
+                                            <p:cond delay="0"/>
+                                          </p:stCondLst>
+                                        </p:cTn>
+                                        <p:tgtEl>
+                                          <p:spTgt spid="3">
+                                            <p:txEl>
+                                              <p:pRg st="3" end="3"/>
+                                            </p:txEl>
+                                          </p:spTgt>
+                                        </p:tgtEl>
+                                        <p:attrNameLst>
+                                          <p:attrName>style.visibility</p:attrName>
+                                        </p:attrNameLst>
+                                      </p:cBhvr>
+                                      <p:to>
+                                        <p:strVal val="visible"/>
+                                      </p:to>
+                                    </p:set>
+                                  </p:childTnLst>
+                                </p:cTn>
+                              </p:par>
+                            </p:childTnLst>
+                          </p:cTn>
+                        </p:par>
+                      </p:childTnLst>
+                    </p:cTn>
+                  </p:par>
+                  <p:par>
+                    <p:cTn id="15" fill="hold">
+                      <p:stCondLst>
+                        <p:cond delay="indefinite"/>
+                      </p:stCondLst>
+                      <p:childTnLst>
+                        <p:par>
+                          <p:cTn id="16" fill="hold">
+                            <p:stCondLst>
+                              <p:cond delay="0"/>
+                            </p:stCondLst>
+                            <p:childTnLst>
+                              <p:par>
+                                <p:cTn id="17" presetID="1" presetClass="entr" presetSubtype="0" fill="hold" grpId="0" nodeType="clickEffect">
+                                  <p:stCondLst>
+                                    <p:cond delay="0"/>
+                                  </p:stCondLst>
+                                  <p:childTnLst>
+                                    <p:set>
+                                      <p:cBhvr>
+                                        <p:cTn id="18" dur="1" fill="hold">
+                                          <p:stCondLst>
+                                            <p:cond delay="0"/>
+                                          </p:stCondLst>
+                                        </p:cTn>
+                                        <p:tgtEl>
+                                          <p:spTgt spid="3">
+                                            <p:txEl>
+                                              <p:pRg st="4" end="4"/>
+                                            </p:txEl>
+                                          </p:spTgt>
+                                        </p:tgtEl>
+                                        <p:attrNameLst>
+                                          <p:attrName>style.visibility</p:attrName>
+                                        </p:attrNameLst>
+                                      </p:cBhvr>
+                                      <p:to>
+                                        <p:strVal val="visible"/>
+                                      </p:to>
+                                    </p:set>
+                                  </p:childTnLst>
+                                </p:cTn>
+                              </p:par>
+                            </p:childTnLst>
+                          </p:cTn>
+                        </p:par>
+                      </p:childTnLst>
+                    </p:cTn>
+                  </p:par>
+                </p:childTnLst>
+              </p:cTn>
+              <p:prevCondLst>
+                <p:cond evt="onPrev" delay="0">
+                  <p:tgtEl>
+                    <p:sldTgt/>
+                  </p:tgtEl>
+                </p:cond>
+              </p:prevCondLst>
+              <p:nextCondLst>
+                <p:cond evt="onNext" delay="0">
+                  <p:tgtEl>
+                    <p:sldTgt/>
+                  </p:tgtEl>
+                </p:cond>
+              </p:nextCondLst>
+            </p:seq>
+          </p:childTnLst>
+        </p:cTn>
+      </p:par>
+    </p:tnLst>
+    <p:bldLst>
+      <p:bldP spid="3" grpId="0" uiExpand="1" build="p"/>
+    </p:bldLst>
+  </p:timing>
+</p:sld>
+</file>
+
+<file path=ppt/slides/slide23.xml><?xml version="1.0" encoding="utf-8"?>
+<p:sld xmlns:a="http://schemas.openxmlformats.org/drawingml/2006/main" xmlns:r="http://schemas.openxmlformats.org/officeDocument/2006/relationships" xmlns:p="http://schemas.openxmlformats.org/presentationml/2006/main">
+  <p:cSld>
+    <p:spTree>
+      <p:nvGrpSpPr>
+        <p:cNvPr id="1" name=""/>
+        <p:cNvGrpSpPr/>
+        <p:nvPr/>
+      </p:nvGrpSpPr>
+      <p:grpSpPr>
+        <a:xfrm>
+          <a:off x="0" y="0"/>
+          <a:ext cx="0" cy="0"/>
+          <a:chOff x="0" y="0"/>
+          <a:chExt cx="0" cy="0"/>
+        </a:xfrm>
+      </p:grpSpPr>
+      <p:sp>
+        <p:nvSpPr>
+          <p:cNvPr id="2" name="Title 1"/>
+          <p:cNvSpPr>
+            <a:spLocks noGrp="1"/>
+          </p:cNvSpPr>
+          <p:nvPr>
+            <p:ph type="title"/>
+          </p:nvPr>
+        </p:nvSpPr>
+        <p:spPr>
+          <a:xfrm>
+            <a:off x="722313" y="3305176"/>
+            <a:ext cx="7772400" cy="1021556"/>
+          </a:xfrm>
+        </p:spPr>
+        <p:txBody>
+          <a:bodyPr/>
+          <a:lstStyle/>
+          <a:p>
+            <a:pPr lvl="0" indent="0" marL="0">
+              <a:buNone/>
+            </a:pPr>
+            <a:r>
+              <a:rPr/>
+              <a:t>Analyse Descriptive des Series en transformation LN</a:t>
+            </a:r>
+          </a:p>
+        </p:txBody>
+      </p:sp>
+    </p:spTree>
+  </p:cSld>
+</p:sld>
+</file>
+
+<file path=ppt/slides/slide24.xml><?xml version="1.0" encoding="utf-8"?>
+<p:sld xmlns:a="http://schemas.openxmlformats.org/drawingml/2006/main" xmlns:r="http://schemas.openxmlformats.org/officeDocument/2006/relationships" xmlns:p="http://schemas.openxmlformats.org/presentationml/2006/main">
+  <p:cSld>
+    <p:spTree>
+      <p:nvGrpSpPr>
+        <p:cNvPr id="1" name=""/>
+        <p:cNvGrpSpPr/>
+        <p:nvPr/>
+      </p:nvGrpSpPr>
+      <p:grpSpPr>
+        <a:xfrm>
+          <a:off x="0" y="0"/>
+          <a:ext cx="0" cy="0"/>
+          <a:chOff x="0" y="0"/>
+          <a:chExt cx="0" cy="0"/>
+        </a:xfrm>
+      </p:grpSpPr>
+      <p:sp>
+        <p:nvSpPr>
+          <p:cNvPr id="2" name="Title 1"/>
+          <p:cNvSpPr>
+            <a:spLocks noGrp="1"/>
+          </p:cNvSpPr>
+          <p:nvPr>
+            <p:ph type="title"/>
+          </p:nvPr>
+        </p:nvSpPr>
+        <p:spPr/>
+        <p:txBody>
+          <a:bodyPr/>
+          <a:lstStyle/>
+          <a:p>
+            <a:pPr lvl="0" indent="0" marL="0">
+              <a:buNone/>
+            </a:pPr>
+            <a:r>
+              <a:rPr/>
+              <a:t>Indicateurs statistiques des variables utilisees dans la modelisation econometrique</a:t>
+            </a:r>
+          </a:p>
+        </p:txBody>
+      </p:sp>
+      <p:graphicFrame>
+        <p:nvGraphicFramePr>
+          <p:cNvPr id="6" name="Content Placeholder 5"/>
+          <p:cNvGraphicFramePr>
+            <a:graphicFrameLocks noGrp="1"/>
+          </p:cNvGraphicFramePr>
+          <p:nvPr>
+            <p:ph idx="1"/>
+          </p:nvPr>
+        </p:nvGraphicFramePr>
+        <p:xfrm>
+          <a:off x="457200" y="1193800"/>
+          <a:ext cx="8229600" cy="3390900"/>
+        </p:xfrm>
+        <a:graphic>
+          <a:graphicData uri="http://schemas.openxmlformats.org/drawingml/2006/table">
+            <a:tbl>
+              <a:tblPr firstRow="1" bandRow="1">
+                <a:tableStyleId>{5C22544A-7EE6-4342-B048-85BDC9FD1C3A}</a:tableStyleId>
+              </a:tblPr>
+              <a:tblGrid>
+                <a:gridCol w="812800"/>
+                <a:gridCol w="812800"/>
+                <a:gridCol w="812800"/>
+                <a:gridCol w="812800"/>
+                <a:gridCol w="812800"/>
+                <a:gridCol w="812800"/>
+                <a:gridCol w="812800"/>
+                <a:gridCol w="812800"/>
+                <a:gridCol w="812800"/>
+                <a:gridCol w="812800"/>
+              </a:tblGrid>
+              <a:tr h="0">
+                <a:tc>
+                  <a:txBody>
+                    <a:bodyPr/>
+                    <a:lstStyle/>
+                    <a:p>
+                      <a:endParaRPr/>
+                    </a:p>
+                  </a:txBody>
+                  <a:tcPr/>
+                </a:tc>
+                <a:tc>
+                  <a:txBody>
+                    <a:bodyPr/>
+                    <a:lstStyle/>
+                    <a:p>
+                      <a:pPr lvl="0" indent="0" marL="0">
+                        <a:buNone/>
+                      </a:pPr>
+                      <a:r>
+                        <a:rPr/>
+                        <a:t>mean</a:t>
+                      </a:r>
+                    </a:p>
+                  </a:txBody>
+                  <a:tcPr/>
+                </a:tc>
+                <a:tc>
+                  <a:txBody>
+                    <a:bodyPr/>
+                    <a:lstStyle/>
+                    <a:p>
+                      <a:pPr lvl="0" indent="0" marL="0">
+                        <a:buNone/>
+                      </a:pPr>
+                      <a:r>
+                        <a:rPr/>
+                        <a:t>std. dev.</a:t>
+                      </a:r>
+                    </a:p>
+                  </a:txBody>
+                  <a:tcPr/>
+                </a:tc>
+                <a:tc>
+                  <a:txBody>
+                    <a:bodyPr/>
+                    <a:lstStyle/>
+                    <a:p>
+                      <a:pPr lvl="0" indent="0" marL="0">
+                        <a:buNone/>
+                      </a:pPr>
+                      <a:r>
+                        <a:rPr/>
+                        <a:t>median</a:t>
+                      </a:r>
+                    </a:p>
+                  </a:txBody>
+                  <a:tcPr/>
+                </a:tc>
+                <a:tc>
+                  <a:txBody>
+                    <a:bodyPr/>
+                    <a:lstStyle/>
+                    <a:p>
+                      <a:pPr lvl="0" indent="0" marL="0">
+                        <a:buNone/>
+                      </a:pPr>
+                      <a:r>
+                        <a:rPr/>
+                        <a:t>min</a:t>
+                      </a:r>
+                    </a:p>
+                  </a:txBody>
+                  <a:tcPr/>
+                </a:tc>
+                <a:tc>
+                  <a:txBody>
+                    <a:bodyPr/>
+                    <a:lstStyle/>
+                    <a:p>
+                      <a:pPr lvl="0" indent="0" marL="0">
+                        <a:buNone/>
+                      </a:pPr>
+                      <a:r>
+                        <a:rPr/>
+                        <a:t>max</a:t>
+                      </a:r>
+                    </a:p>
+                  </a:txBody>
+                  <a:tcPr/>
+                </a:tc>
+                <a:tc>
+                  <a:txBody>
+                    <a:bodyPr/>
+                    <a:lstStyle/>
+                    <a:p>
+                      <a:pPr lvl="0" indent="0" marL="0">
+                        <a:buNone/>
+                      </a:pPr>
+                      <a:r>
+                        <a:rPr/>
+                        <a:t>skewness</a:t>
+                      </a:r>
+                    </a:p>
+                  </a:txBody>
+                  <a:tcPr/>
+                </a:tc>
+                <a:tc>
+                  <a:txBody>
+                    <a:bodyPr/>
+                    <a:lstStyle/>
+                    <a:p>
+                      <a:pPr lvl="0" indent="0" marL="0">
+                        <a:buNone/>
+                      </a:pPr>
+                      <a:r>
+                        <a:rPr/>
+                        <a:t>kurtosis</a:t>
+                      </a:r>
+                    </a:p>
+                  </a:txBody>
+                  <a:tcPr/>
+                </a:tc>
+                <a:tc>
+                  <a:txBody>
+                    <a:bodyPr/>
+                    <a:lstStyle/>
+                    <a:p>
+                      <a:pPr lvl="0" indent="0" marL="0">
+                        <a:buNone/>
+                      </a:pPr>
+                      <a:r>
+                        <a:rPr/>
+                        <a:t>Jarque.Bera</a:t>
+                      </a:r>
+                    </a:p>
+                  </a:txBody>
+                  <a:tcPr/>
+                </a:tc>
+                <a:tc>
+                  <a:txBody>
+                    <a:bodyPr/>
+                    <a:lstStyle/>
+                    <a:p>
+                      <a:pPr lvl="0" indent="0" marL="0">
+                        <a:buNone/>
+                      </a:pPr>
+                      <a:r>
+                        <a:rPr/>
+                        <a:t>Probability</a:t>
+                      </a:r>
+                    </a:p>
+                  </a:txBody>
+                  <a:tcPr/>
+                </a:tc>
+              </a:tr>
+              <a:tr h="0">
+                <a:tc>
+                  <a:txBody>
+                    <a:bodyPr/>
+                    <a:lstStyle/>
+                    <a:p>
+                      <a:pPr lvl="0" indent="0" marL="0">
+                        <a:buNone/>
+                      </a:pPr>
+                      <a:r>
+                        <a:rPr/>
+                        <a:t>Taux.Change</a:t>
+                      </a:r>
+                    </a:p>
+                  </a:txBody>
+                </a:tc>
+                <a:tc>
+                  <a:txBody>
+                    <a:bodyPr/>
+                    <a:lstStyle/>
+                    <a:p>
+                      <a:pPr lvl="0" indent="0" marL="0">
+                        <a:buNone/>
+                      </a:pPr>
+                      <a:r>
+                        <a:rPr/>
+                        <a:t>3.341322</a:t>
+                      </a:r>
+                    </a:p>
+                  </a:txBody>
+                </a:tc>
+                <a:tc>
+                  <a:txBody>
+                    <a:bodyPr/>
+                    <a:lstStyle/>
+                    <a:p>
+                      <a:pPr lvl="0" indent="0" marL="0">
+                        <a:buNone/>
+                      </a:pPr>
+                      <a:r>
+                        <a:rPr/>
+                        <a:t>0.8631124</a:t>
+                      </a:r>
+                    </a:p>
+                  </a:txBody>
+                </a:tc>
+                <a:tc>
+                  <a:txBody>
+                    <a:bodyPr/>
+                    <a:lstStyle/>
+                    <a:p>
+                      <a:pPr lvl="0" indent="0" marL="0">
+                        <a:buNone/>
+                      </a:pPr>
+                      <a:r>
+                        <a:rPr/>
+                        <a:t>3.666317</a:t>
+                      </a:r>
+                    </a:p>
+                  </a:txBody>
+                </a:tc>
+                <a:tc>
+                  <a:txBody>
+                    <a:bodyPr/>
+                    <a:lstStyle/>
+                    <a:p>
+                      <a:pPr lvl="0" indent="0" marL="0">
+                        <a:buNone/>
+                      </a:pPr>
+                      <a:r>
+                        <a:rPr/>
+                        <a:t>1.609438</a:t>
+                      </a:r>
+                    </a:p>
+                  </a:txBody>
+                </a:tc>
+                <a:tc>
+                  <a:txBody>
+                    <a:bodyPr/>
+                    <a:lstStyle/>
+                    <a:p>
+                      <a:pPr lvl="0" indent="0" marL="0">
+                        <a:buNone/>
+                      </a:pPr>
+                      <a:r>
+                        <a:rPr/>
+                        <a:t>4.750402</a:t>
+                      </a:r>
+                    </a:p>
+                  </a:txBody>
+                </a:tc>
+                <a:tc>
+                  <a:txBody>
+                    <a:bodyPr/>
+                    <a:lstStyle/>
+                    <a:p>
+                      <a:pPr lvl="0" indent="0" marL="0">
+                        <a:buNone/>
+                      </a:pPr>
+                      <a:r>
+                        <a:rPr/>
+                        <a:t>-0.53140728</a:t>
+                      </a:r>
+                    </a:p>
+                  </a:txBody>
+                </a:tc>
+                <a:tc>
+                  <a:txBody>
+                    <a:bodyPr/>
+                    <a:lstStyle/>
+                    <a:p>
+                      <a:pPr lvl="0" indent="0" marL="0">
+                        <a:buNone/>
+                      </a:pPr>
+                      <a:r>
+                        <a:rPr/>
+                        <a:t>-0.6167373</a:t>
+                      </a:r>
+                    </a:p>
+                  </a:txBody>
+                </a:tc>
+                <a:tc>
+                  <a:txBody>
+                    <a:bodyPr/>
+                    <a:lstStyle/>
+                    <a:p>
+                      <a:pPr lvl="0" indent="0" marL="0">
+                        <a:buNone/>
+                      </a:pPr>
+                      <a:r>
+                        <a:rPr/>
+                        <a:t>2.125285</a:t>
+                      </a:r>
+                    </a:p>
+                  </a:txBody>
+                </a:tc>
+                <a:tc>
+                  <a:txBody>
+                    <a:bodyPr/>
+                    <a:lstStyle/>
+                    <a:p>
+                      <a:pPr lvl="0" indent="0" marL="0">
+                        <a:buNone/>
+                      </a:pPr>
+                      <a:r>
+                        <a:rPr/>
+                        <a:t>0.3455416</a:t>
+                      </a:r>
+                    </a:p>
+                  </a:txBody>
+                </a:tc>
+              </a:tr>
+              <a:tr h="0">
+                <a:tc>
+                  <a:txBody>
+                    <a:bodyPr/>
+                    <a:lstStyle/>
+                    <a:p>
+                      <a:pPr lvl="0" indent="0" marL="0">
+                        <a:buNone/>
+                      </a:pPr>
+                      <a:r>
+                        <a:rPr/>
+                        <a:t>Importation</a:t>
+                      </a:r>
+                    </a:p>
+                  </a:txBody>
+                </a:tc>
+                <a:tc>
+                  <a:txBody>
+                    <a:bodyPr/>
+                    <a:lstStyle/>
+                    <a:p>
+                      <a:pPr lvl="0" indent="0" marL="0">
+                        <a:buNone/>
+                      </a:pPr>
+                      <a:r>
+                        <a:rPr/>
+                        <a:t>21.629906</a:t>
+                      </a:r>
+                    </a:p>
+                  </a:txBody>
+                </a:tc>
+                <a:tc>
+                  <a:txBody>
+                    <a:bodyPr/>
+                    <a:lstStyle/>
+                    <a:p>
+                      <a:pPr lvl="0" indent="0" marL="0">
+                        <a:buNone/>
+                      </a:pPr>
+                      <a:r>
+                        <a:rPr/>
+                        <a:t>0.7191157</a:t>
+                      </a:r>
+                    </a:p>
+                  </a:txBody>
+                </a:tc>
+                <a:tc>
+                  <a:txBody>
+                    <a:bodyPr/>
+                    <a:lstStyle/>
+                    <a:p>
+                      <a:pPr lvl="0" indent="0" marL="0">
+                        <a:buNone/>
+                      </a:pPr>
+                      <a:r>
+                        <a:rPr/>
+                        <a:t>21.710944</a:t>
+                      </a:r>
+                    </a:p>
+                  </a:txBody>
+                </a:tc>
+                <a:tc>
+                  <a:txBody>
+                    <a:bodyPr/>
+                    <a:lstStyle/>
+                    <a:p>
+                      <a:pPr lvl="0" indent="0" marL="0">
+                        <a:buNone/>
+                      </a:pPr>
+                      <a:r>
+                        <a:rPr/>
+                        <a:t>20.256302</a:t>
+                      </a:r>
+                    </a:p>
+                  </a:txBody>
+                </a:tc>
+                <a:tc>
+                  <a:txBody>
+                    <a:bodyPr/>
+                    <a:lstStyle/>
+                    <a:p>
+                      <a:pPr lvl="0" indent="0" marL="0">
+                        <a:buNone/>
+                      </a:pPr>
+                      <a:r>
+                        <a:rPr/>
+                        <a:t>22.563533</a:t>
+                      </a:r>
+                    </a:p>
+                  </a:txBody>
+                </a:tc>
+                <a:tc>
+                  <a:txBody>
+                    <a:bodyPr/>
+                    <a:lstStyle/>
+                    <a:p>
+                      <a:pPr lvl="0" indent="0" marL="0">
+                        <a:buNone/>
+                      </a:pPr>
+                      <a:r>
+                        <a:rPr/>
+                        <a:t>-0.62111600</a:t>
+                      </a:r>
+                    </a:p>
+                  </a:txBody>
+                </a:tc>
+                <a:tc>
+                  <a:txBody>
+                    <a:bodyPr/>
+                    <a:lstStyle/>
+                    <a:p>
+                      <a:pPr lvl="0" indent="0" marL="0">
+                        <a:buNone/>
+                      </a:pPr>
+                      <a:r>
+                        <a:rPr/>
+                        <a:t>-0.9216365</a:t>
+                      </a:r>
+                    </a:p>
+                  </a:txBody>
+                </a:tc>
+                <a:tc>
+                  <a:txBody>
+                    <a:bodyPr/>
+                    <a:lstStyle/>
+                    <a:p>
+                      <a:pPr lvl="0" indent="0" marL="0">
+                        <a:buNone/>
+                      </a:pPr>
+                      <a:r>
+                        <a:rPr/>
+                        <a:t>3.382576</a:t>
+                      </a:r>
+                    </a:p>
+                  </a:txBody>
+                </a:tc>
+                <a:tc>
+                  <a:txBody>
+                    <a:bodyPr/>
+                    <a:lstStyle/>
+                    <a:p>
+                      <a:pPr lvl="0" indent="0" marL="0">
+                        <a:buNone/>
+                      </a:pPr>
+                      <a:r>
+                        <a:rPr/>
+                        <a:t>0.1842820</a:t>
+                      </a:r>
+                    </a:p>
+                  </a:txBody>
+                </a:tc>
+              </a:tr>
+              <a:tr h="0">
+                <a:tc>
+                  <a:txBody>
+                    <a:bodyPr/>
+                    <a:lstStyle/>
+                    <a:p>
+                      <a:pPr lvl="0" indent="0" marL="0">
+                        <a:buNone/>
+                      </a:pPr>
+                      <a:r>
+                        <a:rPr/>
+                        <a:t>Exportation</a:t>
+                      </a:r>
+                    </a:p>
+                  </a:txBody>
+                </a:tc>
+                <a:tc>
+                  <a:txBody>
+                    <a:bodyPr/>
+                    <a:lstStyle/>
+                    <a:p>
+                      <a:pPr lvl="0" indent="0" marL="0">
+                        <a:buNone/>
+                      </a:pPr>
+                      <a:r>
+                        <a:rPr/>
+                        <a:t>20.395975</a:t>
+                      </a:r>
+                    </a:p>
+                  </a:txBody>
+                </a:tc>
+                <a:tc>
+                  <a:txBody>
+                    <a:bodyPr/>
+                    <a:lstStyle/>
+                    <a:p>
+                      <a:pPr lvl="0" indent="0" marL="0">
+                        <a:buNone/>
+                      </a:pPr>
+                      <a:r>
+                        <a:rPr/>
+                        <a:t>0.6262864</a:t>
+                      </a:r>
+                    </a:p>
+                  </a:txBody>
+                </a:tc>
+                <a:tc>
+                  <a:txBody>
+                    <a:bodyPr/>
+                    <a:lstStyle/>
+                    <a:p>
+                      <a:pPr lvl="0" indent="0" marL="0">
+                        <a:buNone/>
+                      </a:pPr>
+                      <a:r>
+                        <a:rPr/>
+                        <a:t>20.347602</a:t>
+                      </a:r>
+                    </a:p>
+                  </a:txBody>
+                </a:tc>
+                <a:tc>
+                  <a:txBody>
+                    <a:bodyPr/>
+                    <a:lstStyle/>
+                    <a:p>
+                      <a:pPr lvl="0" indent="0" marL="0">
+                        <a:buNone/>
+                      </a:pPr>
+                      <a:r>
+                        <a:rPr/>
+                        <a:t>19.341961</a:t>
+                      </a:r>
+                    </a:p>
+                  </a:txBody>
+                </a:tc>
+                <a:tc>
+                  <a:txBody>
+                    <a:bodyPr/>
+                    <a:lstStyle/>
+                    <a:p>
+                      <a:pPr lvl="0" indent="0" marL="0">
+                        <a:buNone/>
+                      </a:pPr>
+                      <a:r>
+                        <a:rPr/>
+                        <a:t>21.281433</a:t>
+                      </a:r>
+                    </a:p>
+                  </a:txBody>
+                </a:tc>
+                <a:tc>
+                  <a:txBody>
+                    <a:bodyPr/>
+                    <a:lstStyle/>
+                    <a:p>
+                      <a:pPr lvl="0" indent="0" marL="0">
+                        <a:buNone/>
+                      </a:pPr>
+                      <a:r>
+                        <a:rPr/>
+                        <a:t>0.04922427</a:t>
+                      </a:r>
+                    </a:p>
+                  </a:txBody>
+                </a:tc>
+                <a:tc>
+                  <a:txBody>
+                    <a:bodyPr/>
+                    <a:lstStyle/>
+                    <a:p>
+                      <a:pPr lvl="0" indent="0" marL="0">
+                        <a:buNone/>
+                      </a:pPr>
+                      <a:r>
+                        <a:rPr/>
+                        <a:t>-1.3199831</a:t>
+                      </a:r>
+                    </a:p>
+                  </a:txBody>
+                </a:tc>
+                <a:tc>
+                  <a:txBody>
+                    <a:bodyPr/>
+                    <a:lstStyle/>
+                    <a:p>
+                      <a:pPr lvl="0" indent="0" marL="0">
+                        <a:buNone/>
+                      </a:pPr>
+                      <a:r>
+                        <a:rPr/>
+                        <a:t>2.184953</a:t>
+                      </a:r>
+                    </a:p>
+                  </a:txBody>
+                </a:tc>
+                <a:tc>
+                  <a:txBody>
+                    <a:bodyPr/>
+                    <a:lstStyle/>
+                    <a:p>
+                      <a:pPr lvl="0" indent="0" marL="0">
+                        <a:buNone/>
+                      </a:pPr>
+                      <a:r>
+                        <a:rPr/>
+                        <a:t>0.3353848</a:t>
+                      </a:r>
+                    </a:p>
+                  </a:txBody>
+                </a:tc>
+              </a:tr>
+              <a:tr h="0">
+                <a:tc>
+                  <a:txBody>
+                    <a:bodyPr/>
+                    <a:lstStyle/>
+                    <a:p>
+                      <a:pPr lvl="0" indent="0" marL="0">
+                        <a:buNone/>
+                      </a:pPr>
+                      <a:r>
+                        <a:rPr/>
+                        <a:t>PIB</a:t>
+                      </a:r>
+                    </a:p>
+                  </a:txBody>
+                </a:tc>
+                <a:tc>
+                  <a:txBody>
+                    <a:bodyPr/>
+                    <a:lstStyle/>
+                    <a:p>
+                      <a:pPr lvl="0" indent="0" marL="0">
+                        <a:buNone/>
+                      </a:pPr>
+                      <a:r>
+                        <a:rPr/>
+                        <a:t>23.235995</a:t>
+                      </a:r>
+                    </a:p>
+                  </a:txBody>
+                </a:tc>
+                <a:tc>
+                  <a:txBody>
+                    <a:bodyPr/>
+                    <a:lstStyle/>
+                    <a:p>
+                      <a:pPr lvl="0" indent="0" marL="0">
+                        <a:buNone/>
+                      </a:pPr>
+                      <a:r>
+                        <a:rPr/>
+                        <a:t>0.1527612</a:t>
+                      </a:r>
+                    </a:p>
+                  </a:txBody>
+                </a:tc>
+                <a:tc>
+                  <a:txBody>
+                    <a:bodyPr/>
+                    <a:lstStyle/>
+                    <a:p>
+                      <a:pPr lvl="0" indent="0" marL="0">
+                        <a:buNone/>
+                      </a:pPr>
+                      <a:r>
+                        <a:rPr/>
+                        <a:t>23.192967</a:t>
+                      </a:r>
+                    </a:p>
+                  </a:txBody>
+                </a:tc>
+                <a:tc>
+                  <a:txBody>
+                    <a:bodyPr/>
+                    <a:lstStyle/>
+                    <a:p>
+                      <a:pPr lvl="0" indent="0" marL="0">
+                        <a:buNone/>
+                      </a:pPr>
+                      <a:r>
+                        <a:rPr/>
+                        <a:t>22.916099</a:t>
+                      </a:r>
+                    </a:p>
+                  </a:txBody>
+                </a:tc>
+                <a:tc>
+                  <a:txBody>
+                    <a:bodyPr/>
+                    <a:lstStyle/>
+                    <a:p>
+                      <a:pPr lvl="0" indent="0" marL="0">
+                        <a:buNone/>
+                      </a:pPr>
+                      <a:r>
+                        <a:rPr/>
+                        <a:t>23.480537</a:t>
+                      </a:r>
+                    </a:p>
+                  </a:txBody>
+                </a:tc>
+                <a:tc>
+                  <a:txBody>
+                    <a:bodyPr/>
+                    <a:lstStyle/>
+                    <a:p>
+                      <a:pPr lvl="0" indent="0" marL="0">
+                        <a:buNone/>
+                      </a:pPr>
+                      <a:r>
+                        <a:rPr/>
+                        <a:t>0.04339912</a:t>
+                      </a:r>
+                    </a:p>
+                  </a:txBody>
+                </a:tc>
+                <a:tc>
+                  <a:txBody>
+                    <a:bodyPr/>
+                    <a:lstStyle/>
+                    <a:p>
+                      <a:pPr lvl="0" indent="0" marL="0">
+                        <a:buNone/>
+                      </a:pPr>
+                      <a:r>
+                        <a:rPr/>
+                        <a:t>-1.2072964</a:t>
+                      </a:r>
+                    </a:p>
+                  </a:txBody>
+                </a:tc>
+                <a:tc>
+                  <a:txBody>
+                    <a:bodyPr/>
+                    <a:lstStyle/>
+                    <a:p>
+                      <a:pPr lvl="0" indent="0" marL="0">
+                        <a:buNone/>
+                      </a:pPr>
+                      <a:r>
+                        <a:rPr/>
+                        <a:t>1.777507</a:t>
+                      </a:r>
+                    </a:p>
+                  </a:txBody>
+                </a:tc>
+                <a:tc>
+                  <a:txBody>
+                    <a:bodyPr/>
+                    <a:lstStyle/>
+                    <a:p>
+                      <a:pPr lvl="0" indent="0" marL="0">
+                        <a:buNone/>
+                      </a:pPr>
+                      <a:r>
+                        <a:rPr/>
+                        <a:t>0.4111679</a:t>
+                      </a:r>
+                    </a:p>
+                  </a:txBody>
+                </a:tc>
+              </a:tr>
+              <a:tr h="0">
+                <a:tc>
+                  <a:txBody>
+                    <a:bodyPr/>
+                    <a:lstStyle/>
+                    <a:p>
+                      <a:pPr lvl="0" indent="0" marL="0">
+                        <a:buNone/>
+                      </a:pPr>
+                      <a:r>
+                        <a:rPr/>
+                        <a:t>PIB.USA</a:t>
+                      </a:r>
+                    </a:p>
+                  </a:txBody>
+                </a:tc>
+                <a:tc>
+                  <a:txBody>
+                    <a:bodyPr/>
+                    <a:lstStyle/>
+                    <a:p>
+                      <a:pPr lvl="0" indent="0" marL="0">
+                        <a:buNone/>
+                      </a:pPr>
+                      <a:r>
+                        <a:rPr/>
+                        <a:t>30.306983</a:t>
+                      </a:r>
+                    </a:p>
+                  </a:txBody>
+                </a:tc>
+                <a:tc>
+                  <a:txBody>
+                    <a:bodyPr/>
+                    <a:lstStyle/>
+                    <a:p>
+                      <a:pPr lvl="0" indent="0" marL="0">
+                        <a:buNone/>
+                      </a:pPr>
+                      <a:r>
+                        <a:rPr/>
+                        <a:t>0.2472806</a:t>
+                      </a:r>
+                    </a:p>
+                  </a:txBody>
+                </a:tc>
+                <a:tc>
+                  <a:txBody>
+                    <a:bodyPr/>
+                    <a:lstStyle/>
+                    <a:p>
+                      <a:pPr lvl="0" indent="0" marL="0">
+                        <a:buNone/>
+                      </a:pPr>
+                      <a:r>
+                        <a:rPr/>
+                        <a:t>30.378308</a:t>
+                      </a:r>
+                    </a:p>
+                  </a:txBody>
+                </a:tc>
+                <a:tc>
+                  <a:txBody>
+                    <a:bodyPr/>
+                    <a:lstStyle/>
+                    <a:p>
+                      <a:pPr lvl="0" indent="0" marL="0">
+                        <a:buNone/>
+                      </a:pPr>
+                      <a:r>
+                        <a:rPr/>
+                        <a:t>29.859779</a:t>
+                      </a:r>
+                    </a:p>
+                  </a:txBody>
+                </a:tc>
+                <a:tc>
+                  <a:txBody>
+                    <a:bodyPr/>
+                    <a:lstStyle/>
+                    <a:p>
+                      <a:pPr lvl="0" indent="0" marL="0">
+                        <a:buNone/>
+                      </a:pPr>
+                      <a:r>
+                        <a:rPr/>
+                        <a:t>30.673288</a:t>
+                      </a:r>
+                    </a:p>
+                  </a:txBody>
+                </a:tc>
+                <a:tc>
+                  <a:txBody>
+                    <a:bodyPr/>
+                    <a:lstStyle/>
+                    <a:p>
+                      <a:pPr lvl="0" indent="0" marL="0">
+                        <a:buNone/>
+                      </a:pPr>
+                      <a:r>
+                        <a:rPr/>
+                        <a:t>-0.35201080</a:t>
+                      </a:r>
+                    </a:p>
+                  </a:txBody>
+                </a:tc>
+                <a:tc>
+                  <a:txBody>
+                    <a:bodyPr/>
+                    <a:lstStyle/>
+                    <a:p>
+                      <a:pPr lvl="0" indent="0" marL="0">
+                        <a:buNone/>
+                      </a:pPr>
+                      <a:r>
+                        <a:rPr/>
+                        <a:t>-1.2152068</a:t>
+                      </a:r>
+                    </a:p>
+                  </a:txBody>
+                </a:tc>
+                <a:tc>
+                  <a:txBody>
+                    <a:bodyPr/>
+                    <a:lstStyle/>
+                    <a:p>
+                      <a:pPr lvl="0" indent="0" marL="0">
+                        <a:buNone/>
+                      </a:pPr>
+                      <a:r>
+                        <a:rPr/>
+                        <a:t>2.581015</a:t>
+                      </a:r>
+                    </a:p>
+                  </a:txBody>
+                </a:tc>
+                <a:tc>
+                  <a:txBody>
+                    <a:bodyPr/>
+                    <a:lstStyle/>
+                    <a:p>
+                      <a:pPr lvl="0" indent="0" marL="0">
+                        <a:buNone/>
+                      </a:pPr>
+                      <a:r>
+                        <a:rPr/>
+                        <a:t>0.2751311</a:t>
+                      </a:r>
+                    </a:p>
+                  </a:txBody>
+                </a:tc>
+              </a:tr>
+              <a:tr h="0">
+                <a:tc>
+                  <a:txBody>
+                    <a:bodyPr/>
+                    <a:lstStyle/>
+                    <a:p>
+                      <a:pPr lvl="0" indent="0" marL="0">
+                        <a:buNone/>
+                      </a:pPr>
+                      <a:r>
+                        <a:rPr/>
+                        <a:t>IPC</a:t>
+                      </a:r>
+                    </a:p>
+                  </a:txBody>
+                </a:tc>
+                <a:tc>
+                  <a:txBody>
+                    <a:bodyPr/>
+                    <a:lstStyle/>
+                    <a:p>
+                      <a:pPr lvl="0" indent="0" marL="0">
+                        <a:buNone/>
+                      </a:pPr>
+                      <a:r>
+                        <a:rPr/>
+                        <a:t>3.919720</a:t>
+                      </a:r>
+                    </a:p>
+                  </a:txBody>
+                </a:tc>
+                <a:tc>
+                  <a:txBody>
+                    <a:bodyPr/>
+                    <a:lstStyle/>
+                    <a:p>
+                      <a:pPr lvl="0" indent="0" marL="0">
+                        <a:buNone/>
+                      </a:pPr>
+                      <a:r>
+                        <a:rPr/>
+                        <a:t>1.2368675</a:t>
+                      </a:r>
+                    </a:p>
+                  </a:txBody>
+                </a:tc>
+                <a:tc>
+                  <a:txBody>
+                    <a:bodyPr/>
+                    <a:lstStyle/>
+                    <a:p>
+                      <a:pPr lvl="0" indent="0" marL="0">
+                        <a:buNone/>
+                      </a:pPr>
+                      <a:r>
+                        <a:rPr/>
+                        <a:t>4.240909</a:t>
+                      </a:r>
+                    </a:p>
+                  </a:txBody>
+                </a:tc>
+                <a:tc>
+                  <a:txBody>
+                    <a:bodyPr/>
+                    <a:lstStyle/>
+                    <a:p>
+                      <a:pPr lvl="0" indent="0" marL="0">
+                        <a:buNone/>
+                      </a:pPr>
+                      <a:r>
+                        <a:rPr/>
+                        <a:t>1.513808</a:t>
+                      </a:r>
+                    </a:p>
+                  </a:txBody>
+                </a:tc>
+                <a:tc>
+                  <a:txBody>
+                    <a:bodyPr/>
+                    <a:lstStyle/>
+                    <a:p>
+                      <a:pPr lvl="0" indent="0" marL="0">
+                        <a:buNone/>
+                      </a:pPr>
+                      <a:r>
+                        <a:rPr/>
+                        <a:t>6.014026</a:t>
+                      </a:r>
+                    </a:p>
+                  </a:txBody>
+                </a:tc>
+                <a:tc>
+                  <a:txBody>
+                    <a:bodyPr/>
+                    <a:lstStyle/>
+                    <a:p>
+                      <a:pPr lvl="0" indent="0" marL="0">
+                        <a:buNone/>
+                      </a:pPr>
+                      <a:r>
+                        <a:rPr/>
+                        <a:t>-0.41242809</a:t>
+                      </a:r>
+                    </a:p>
+                  </a:txBody>
+                </a:tc>
+                <a:tc>
+                  <a:txBody>
+                    <a:bodyPr/>
+                    <a:lstStyle/>
+                    <a:p>
+                      <a:pPr lvl="0" indent="0" marL="0">
+                        <a:buNone/>
+                      </a:pPr>
+                      <a:r>
+                        <a:rPr/>
+                        <a:t>-0.8982359</a:t>
+                      </a:r>
+                    </a:p>
+                  </a:txBody>
+                </a:tc>
+                <a:tc>
+                  <a:txBody>
+                    <a:bodyPr/>
+                    <a:lstStyle/>
+                    <a:p>
+                      <a:pPr lvl="0" indent="0" marL="0">
+                        <a:buNone/>
+                      </a:pPr>
+                      <a:r>
+                        <a:rPr/>
+                        <a:t>1.953293</a:t>
+                      </a:r>
+                    </a:p>
+                  </a:txBody>
+                </a:tc>
+                <a:tc>
+                  <a:txBody>
+                    <a:bodyPr/>
+                    <a:lstStyle/>
+                    <a:p>
+                      <a:pPr lvl="0" indent="0" marL="0">
+                        <a:buNone/>
+                      </a:pPr>
+                      <a:r>
+                        <a:rPr/>
+                        <a:t>0.3765718</a:t>
+                      </a:r>
+                    </a:p>
+                  </a:txBody>
+                </a:tc>
+              </a:tr>
+              <a:tr h="0">
+                <a:tc>
+                  <a:txBody>
+                    <a:bodyPr/>
+                    <a:lstStyle/>
+                    <a:p>
+                      <a:pPr lvl="0" indent="0" marL="0">
+                        <a:buNone/>
+                      </a:pPr>
+                      <a:r>
+                        <a:rPr i="1"/>
+                        <a:t>Note: Observations= 35, p-value treshold=0.05</a:t>
+                      </a:r>
+                    </a:p>
+                  </a:txBody>
+                </a:tc>
+                <a:tc>
+                  <a:txBody>
+                    <a:bodyPr/>
+                    <a:lstStyle/>
+                    <a:p>
+                      <a:endParaRPr/>
+                    </a:p>
+                  </a:txBody>
+                </a:tc>
+                <a:tc>
+                  <a:txBody>
+                    <a:bodyPr/>
+                    <a:lstStyle/>
+                    <a:p>
+                      <a:endParaRPr/>
+                    </a:p>
+                  </a:txBody>
+                </a:tc>
+                <a:tc>
+                  <a:txBody>
+                    <a:bodyPr/>
+                    <a:lstStyle/>
+                    <a:p>
+                      <a:endParaRPr/>
+                    </a:p>
+                  </a:txBody>
+                </a:tc>
+                <a:tc>
+                  <a:txBody>
+                    <a:bodyPr/>
+                    <a:lstStyle/>
+                    <a:p>
+                      <a:endParaRPr/>
+                    </a:p>
+                  </a:txBody>
+                </a:tc>
+                <a:tc>
+                  <a:txBody>
+                    <a:bodyPr/>
+                    <a:lstStyle/>
+                    <a:p>
+                      <a:endParaRPr/>
+                    </a:p>
+                  </a:txBody>
+                </a:tc>
+                <a:tc>
+                  <a:txBody>
+                    <a:bodyPr/>
+                    <a:lstStyle/>
+                    <a:p>
+                      <a:endParaRPr/>
+                    </a:p>
+                  </a:txBody>
+                </a:tc>
+                <a:tc>
+                  <a:txBody>
+                    <a:bodyPr/>
+                    <a:lstStyle/>
+                    <a:p>
+                      <a:endParaRPr/>
+                    </a:p>
+                  </a:txBody>
+                </a:tc>
+                <a:tc>
+                  <a:txBody>
+                    <a:bodyPr/>
+                    <a:lstStyle/>
+                    <a:p>
+                      <a:endParaRPr/>
+                    </a:p>
+                  </a:txBody>
+                </a:tc>
+                <a:tc>
+                  <a:txBody>
+                    <a:bodyPr/>
+                    <a:lstStyle/>
+                    <a:p>
+                      <a:endParaRPr/>
+                    </a:p>
+                  </a:txBody>
+                </a:tc>
+              </a:tr>
+              <a:tr h="0">
+                <a:tc>
+                  <a:txBody>
+                    <a:bodyPr/>
+                    <a:lstStyle/>
+                    <a:p>
+                      <a:pPr lvl="0" indent="0" marL="0">
+                        <a:buNone/>
+                      </a:pPr>
+                      <a:r>
+                        <a:rPr b="1"/>
+                        <a:t>Source:</a:t>
+                      </a:r>
+                      <a:r>
+                        <a:rPr/>
+                        <a:t> Indicateurs calcules par l’auteur avec R</a:t>
+                      </a:r>
+                    </a:p>
+                  </a:txBody>
+                </a:tc>
+                <a:tc>
+                  <a:txBody>
+                    <a:bodyPr/>
+                    <a:lstStyle/>
+                    <a:p>
+                      <a:endParaRPr/>
+                    </a:p>
+                  </a:txBody>
+                </a:tc>
+                <a:tc>
+                  <a:txBody>
+                    <a:bodyPr/>
+                    <a:lstStyle/>
+                    <a:p>
+                      <a:endParaRPr/>
+                    </a:p>
+                  </a:txBody>
+                </a:tc>
+                <a:tc>
+                  <a:txBody>
+                    <a:bodyPr/>
+                    <a:lstStyle/>
+                    <a:p>
+                      <a:endParaRPr/>
+                    </a:p>
+                  </a:txBody>
+                </a:tc>
+                <a:tc>
+                  <a:txBody>
+                    <a:bodyPr/>
+                    <a:lstStyle/>
+                    <a:p>
+                      <a:endParaRPr/>
+                    </a:p>
+                  </a:txBody>
+                </a:tc>
+                <a:tc>
+                  <a:txBody>
+                    <a:bodyPr/>
+                    <a:lstStyle/>
+                    <a:p>
+                      <a:endParaRPr/>
+                    </a:p>
+                  </a:txBody>
+                </a:tc>
+                <a:tc>
+                  <a:txBody>
+                    <a:bodyPr/>
+                    <a:lstStyle/>
+                    <a:p>
+                      <a:endParaRPr/>
+                    </a:p>
+                  </a:txBody>
+                </a:tc>
+                <a:tc>
+                  <a:txBody>
+                    <a:bodyPr/>
+                    <a:lstStyle/>
+                    <a:p>
+                      <a:endParaRPr/>
+                    </a:p>
+                  </a:txBody>
+                </a:tc>
+                <a:tc>
+                  <a:txBody>
+                    <a:bodyPr/>
+                    <a:lstStyle/>
+                    <a:p>
+                      <a:endParaRPr/>
+                    </a:p>
+                  </a:txBody>
+                </a:tc>
+                <a:tc>
+                  <a:txBody>
+                    <a:bodyPr/>
+                    <a:lstStyle/>
+                    <a:p>
+                      <a:endParaRPr/>
+                    </a:p>
+                  </a:txBody>
+                </a:tc>
+              </a:tr>
+            </a:tbl>
+          </a:graphicData>
+        </a:graphic>
+      </p:graphicFrame>
     </p:spTree>
   </p:cSld>
 </p:sld>
@@ -12234,7 +14888,7 @@
             </a:pPr>
             <a:r>
               <a:rPr/>
-              <a:t>Analyse Graphiques</a:t>
+              <a:t>Analyse graphiques evolution des series allant de 1988 a 2022</a:t>
             </a:r>
           </a:p>
         </p:txBody>
@@ -12281,14 +14935,14 @@
             </a:pPr>
             <a:r>
               <a:rPr/>
-              <a:t>Graphes des donnees Brutes</a:t>
+              <a:t>Taux de Change</a:t>
             </a:r>
           </a:p>
         </p:txBody>
       </p:sp>
       <p:pic>
         <p:nvPicPr>
-          <p:cNvPr descr="modele_presentation_files/figure-pptx/brut%20plot-1.png" id="0" name="Picture 1"/>
+          <p:cNvPr descr="modele_presentation_files/figure-pptx/tx.c%20brut%20plot-1.png" id="0" name="Picture 1"/>
           <p:cNvPicPr>
             <a:picLocks noGrp="1" noChangeAspect="1"/>
           </p:cNvPicPr>
@@ -12358,14 +15012,14 @@
             </a:pPr>
             <a:r>
               <a:rPr/>
-              <a:t>Graphes des donnees en Logarithme Neperien</a:t>
+              <a:t>Importation</a:t>
             </a:r>
           </a:p>
         </p:txBody>
       </p:sp>
       <p:pic>
         <p:nvPicPr>
-          <p:cNvPr descr="modele_presentation_files/figure-pptx/plot%20log-1.png" id="0" name="Picture 1"/>
+          <p:cNvPr descr="modele_presentation_files/figure-pptx/Imp%20brut%20plot-1.png" id="0" name="Picture 1"/>
           <p:cNvPicPr>
             <a:picLocks noGrp="1" noChangeAspect="1"/>
           </p:cNvPicPr>

</xml_diff>

<commit_message>
on to descriptives and more
</commit_message>
<xml_diff>
--- a/modele_presentation.pptx
+++ b/modele_presentation.pptx
@@ -4186,7 +4186,7 @@
           </a:p>
           <a:p>
             <a:pPr lvl="0" indent="-342900" marL="342900">
-              <a:buAutoNum startAt="2" type="arabicPeriod"/>
+              <a:buAutoNum type="arabicPeriod"/>
             </a:pPr>
             <a:r>
               <a:rPr b="1"/>
@@ -4199,7 +4199,7 @@
           </a:p>
           <a:p>
             <a:pPr lvl="0" indent="-342900" marL="342900">
-              <a:buAutoNum startAt="3" type="arabicPeriod"/>
+              <a:buAutoNum type="arabicPeriod"/>
             </a:pPr>
             <a:r>
               <a:rPr b="1"/>
@@ -4212,7 +4212,7 @@
           </a:p>
           <a:p>
             <a:pPr lvl="0" indent="-342900" marL="342900">
-              <a:buAutoNum startAt="4" type="arabicPeriod"/>
+              <a:buAutoNum type="arabicPeriod"/>
             </a:pPr>
             <a:r>
               <a:rPr b="1"/>

</xml_diff>

<commit_message>
ok nice option with knitr
</commit_message>
<xml_diff>
--- a/modele_presentation.pptx
+++ b/modele_presentation.pptx
@@ -36,6 +36,8 @@
     <p:sldId id="284" r:id="rId30"/>
     <p:sldId id="285" r:id="rId31"/>
     <p:sldId id="286" r:id="rId32"/>
+    <p:sldId id="287" r:id="rId33"/>
+    <p:sldId id="288" r:id="rId34"/>
   </p:sldIdLst>
   <p:sldSz cx="9144000" cy="5143500" type="screen16x9"/>
   <p:notesSz cx="6858000" cy="9144000"/>
@@ -7414,7 +7416,32 @@
             </a:pPr>
             <a:r>
               <a:rPr/>
-              <a:t>Les series en Niveau</a:t>
+              <a:t>Procedure</a:t>
+            </a:r>
+          </a:p>
+        </p:txBody>
+      </p:sp>
+      <p:sp>
+        <p:nvSpPr>
+          <p:cNvPr id="3" name="Content Placeholder 2"/>
+          <p:cNvSpPr>
+            <a:spLocks noGrp="1"/>
+          </p:cNvSpPr>
+          <p:nvPr>
+            <p:ph idx="1"/>
+          </p:nvPr>
+        </p:nvSpPr>
+        <p:spPr/>
+        <p:txBody>
+          <a:bodyPr/>
+          <a:lstStyle/>
+          <a:p>
+            <a:pPr lvl="0" indent="0" marL="0">
+              <a:buNone/>
+            </a:pPr>
+            <a:r>
+              <a:rPr/>
+              <a:t>La procedure d’etude de la stationarite demande que l’on procede de stationarite pour les series en niveau. Ensuite on passe le filtre de difference sur les series et on recommence les tests.</a:t>
             </a:r>
           </a:p>
         </p:txBody>
@@ -7461,11 +7488,1082 @@
             </a:pPr>
             <a:r>
               <a:rPr/>
-              <a:t>Les series en diff premiere</a:t>
+              <a:t>Filtre de difference</a:t>
             </a:r>
           </a:p>
         </p:txBody>
       </p:sp>
+      <mc:AlternateContent xmlns:mc="http://schemas.openxmlformats.org/markup-compatibility/2006">
+        <mc:Choice xmlns:a14="http://schemas.microsoft.com/office/drawing/2010/main" Requires="a14">
+          <p:sp>
+            <p:nvSpPr>
+              <p:cNvPr id="3" name="Content Placeholder 2"/>
+              <p:cNvSpPr>
+                <a:spLocks noGrp="1"/>
+              </p:cNvSpPr>
+              <p:nvPr>
+                <p:ph idx="1"/>
+              </p:nvPr>
+            </p:nvSpPr>
+            <p:spPr/>
+            <p:txBody>
+              <a:bodyPr/>
+              <a:lstStyle/>
+              <a:p>
+                <a:pPr lvl="0" indent="0" marL="0">
+                  <a:buNone/>
+                </a:pPr>
+                <a:r>
+                  <a:rPr/>
+                  <a:t>Le filtre de différence est une opération couramment utilisée dans l’analyse des séries chronologiques pour transformer une série en une série stationnaire en différenciant les observations. La différenciation implique de soustraire chaque observation de la série par son observation précédente. Cette opération aide à éliminer les tendances et les structures temporelles de la série, rendant ainsi la série stationnaire. Voici comment le filtre de différence est mathématiquement représenté :</a:t>
+                </a:r>
+              </a:p>
+              <a:p>
+                <a:pPr lvl="0" indent="0" marL="0">
+                  <a:buNone/>
+                </a:pPr>
+                <a:r>
+                  <a:rPr/>
+                  <a:t>Si nous avons une série chronologique </a:t>
+                </a:r>
+                <a14:m>
+                  <m:oMath xmlns:m="http://schemas.openxmlformats.org/officeDocument/2006/math">
+                    <m:sSub>
+                      <m:e>
+                        <m:r>
+                          <m:t>y</m:t>
+                        </m:r>
+                      </m:e>
+                      <m:sub>
+                        <m:r>
+                          <m:t>t</m:t>
+                        </m:r>
+                      </m:sub>
+                    </m:sSub>
+                  </m:oMath>
+                </a14:m>
+                <a:r>
+                  <a:rPr/>
+                  <a:t> pour </a:t>
+                </a:r>
+                <a14:m>
+                  <m:oMath xmlns:m="http://schemas.openxmlformats.org/officeDocument/2006/math">
+                    <m:r>
+                      <m:t>t</m:t>
+                    </m:r>
+                    <m:r>
+                      <m:rPr>
+                        <m:sty m:val="p"/>
+                      </m:rPr>
+                      <m:t>=</m:t>
+                    </m:r>
+                    <m:r>
+                      <m:t>1</m:t>
+                    </m:r>
+                    <m:r>
+                      <m:rPr>
+                        <m:sty m:val="p"/>
+                      </m:rPr>
+                      <m:t>,</m:t>
+                    </m:r>
+                    <m:r>
+                      <m:t>2</m:t>
+                    </m:r>
+                    <m:r>
+                      <m:rPr>
+                        <m:sty m:val="p"/>
+                      </m:rPr>
+                      <m:t>,</m:t>
+                    </m:r>
+                    <m:r>
+                      <m:rPr>
+                        <m:sty m:val="p"/>
+                      </m:rPr>
+                      <m:t>.</m:t>
+                    </m:r>
+                    <m:r>
+                      <m:rPr>
+                        <m:sty m:val="p"/>
+                      </m:rPr>
+                      <m:t>.</m:t>
+                    </m:r>
+                    <m:r>
+                      <m:rPr>
+                        <m:sty m:val="p"/>
+                      </m:rPr>
+                      <m:t>.</m:t>
+                    </m:r>
+                    <m:r>
+                      <m:rPr>
+                        <m:sty m:val="p"/>
+                      </m:rPr>
+                      <m:t>,</m:t>
+                    </m:r>
+                    <m:r>
+                      <m:t>T</m:t>
+                    </m:r>
+                  </m:oMath>
+                </a14:m>
+                <a:r>
+                  <a:rPr/>
+                  <a:t>, alors la série de différences premières, notée </a:t>
+                </a:r>
+                <a14:m>
+                  <m:oMath xmlns:m="http://schemas.openxmlformats.org/officeDocument/2006/math">
+                    <m:r>
+                      <m:t>Δ</m:t>
+                    </m:r>
+                    <m:sSub>
+                      <m:e>
+                        <m:r>
+                          <m:t>y</m:t>
+                        </m:r>
+                      </m:e>
+                      <m:sub>
+                        <m:r>
+                          <m:t>t</m:t>
+                        </m:r>
+                      </m:sub>
+                    </m:sSub>
+                  </m:oMath>
+                </a14:m>
+                <a:r>
+                  <a:rPr/>
+                  <a:t>, est définie comme :</a:t>
+                </a:r>
+              </a:p>
+              <a:p>
+                <a:pPr lvl="0" indent="0" marL="0">
+                  <a:buNone/>
+                </a:pPr>
+                <a14:m>
+                  <m:oMathPara xmlns:m="http://schemas.openxmlformats.org/officeDocument/2006/math">
+                    <m:oMathParaPr>
+                      <m:jc m:val="center"/>
+                    </m:oMathParaPr>
+                    <m:oMath>
+                      <m:r>
+                        <m:t>Δ</m:t>
+                      </m:r>
+                      <m:sSub>
+                        <m:e>
+                          <m:r>
+                            <m:t>y</m:t>
+                          </m:r>
+                        </m:e>
+                        <m:sub>
+                          <m:r>
+                            <m:t>t</m:t>
+                          </m:r>
+                        </m:sub>
+                      </m:sSub>
+                      <m:r>
+                        <m:rPr>
+                          <m:sty m:val="p"/>
+                        </m:rPr>
+                        <m:t>=</m:t>
+                      </m:r>
+                      <m:sSub>
+                        <m:e>
+                          <m:r>
+                            <m:t>y</m:t>
+                          </m:r>
+                        </m:e>
+                        <m:sub>
+                          <m:r>
+                            <m:t>t</m:t>
+                          </m:r>
+                        </m:sub>
+                      </m:sSub>
+                      <m:r>
+                        <m:rPr>
+                          <m:sty m:val="p"/>
+                        </m:rPr>
+                        <m:t>−</m:t>
+                      </m:r>
+                      <m:sSub>
+                        <m:e>
+                          <m:r>
+                            <m:t>y</m:t>
+                          </m:r>
+                        </m:e>
+                        <m:sub>
+                          <m:r>
+                            <m:t>t</m:t>
+                          </m:r>
+                          <m:r>
+                            <m:rPr>
+                              <m:sty m:val="p"/>
+                            </m:rPr>
+                            <m:t>−</m:t>
+                          </m:r>
+                          <m:r>
+                            <m:t>1</m:t>
+                          </m:r>
+                        </m:sub>
+                      </m:sSub>
+                    </m:oMath>
+                  </m:oMathPara>
+                </a14:m>
+              </a:p>
+              <a:p>
+                <a:pPr lvl="0" indent="0" marL="0">
+                  <a:buNone/>
+                </a:pPr>
+                <a:r>
+                  <a:rPr/>
+                  <a:t>Cette équation montre que chaque observation </a:t>
+                </a:r>
+                <a14:m>
+                  <m:oMath xmlns:m="http://schemas.openxmlformats.org/officeDocument/2006/math">
+                    <m:sSub>
+                      <m:e>
+                        <m:r>
+                          <m:t>y</m:t>
+                        </m:r>
+                      </m:e>
+                      <m:sub>
+                        <m:r>
+                          <m:t>t</m:t>
+                        </m:r>
+                      </m:sub>
+                    </m:sSub>
+                  </m:oMath>
+                </a14:m>
+                <a:r>
+                  <a:rPr/>
+                  <a:t>est soustraite de son observation précédente </a:t>
+                </a:r>
+                <a14:m>
+                  <m:oMath xmlns:m="http://schemas.openxmlformats.org/officeDocument/2006/math">
+                    <m:sSub>
+                      <m:e>
+                        <m:r>
+                          <m:t>y</m:t>
+                        </m:r>
+                      </m:e>
+                      <m:sub>
+                        <m:r>
+                          <m:t>t</m:t>
+                        </m:r>
+                        <m:r>
+                          <m:rPr>
+                            <m:sty m:val="p"/>
+                          </m:rPr>
+                          <m:t>−</m:t>
+                        </m:r>
+                        <m:r>
+                          <m:t>1</m:t>
+                        </m:r>
+                      </m:sub>
+                    </m:sSub>
+                  </m:oMath>
+                </a14:m>
+                <a:r>
+                  <a:rPr/>
+                  <a:t> pour obtenir la différence première </a:t>
+                </a:r>
+                <a14:m>
+                  <m:oMath xmlns:m="http://schemas.openxmlformats.org/officeDocument/2006/math">
+                    <m:r>
+                      <m:t>Δ</m:t>
+                    </m:r>
+                    <m:sSub>
+                      <m:e>
+                        <m:r>
+                          <m:t>y</m:t>
+                        </m:r>
+                      </m:e>
+                      <m:sub>
+                        <m:r>
+                          <m:t>t</m:t>
+                        </m:r>
+                      </m:sub>
+                    </m:sSub>
+                  </m:oMath>
+                </a14:m>
+                <a:r>
+                  <a:rPr/>
+                  <a:t>. Cela peut être répété pour chaque observation dans la série, créant ainsi une nouvelle série de différences premières avec une longueur de </a:t>
+                </a:r>
+                <a14:m>
+                  <m:oMath xmlns:m="http://schemas.openxmlformats.org/officeDocument/2006/math">
+                    <m:r>
+                      <m:t>T</m:t>
+                    </m:r>
+                    <m:r>
+                      <m:rPr>
+                        <m:sty m:val="p"/>
+                      </m:rPr>
+                      <m:t>−</m:t>
+                    </m:r>
+                    <m:r>
+                      <m:t>1</m:t>
+                    </m:r>
+                  </m:oMath>
+                </a14:m>
+                <a:r>
+                  <a:rPr/>
+                  <a:t>, car la première observation n’a pas de valeur précédente à soustraire.</a:t>
+                </a:r>
+              </a:p>
+              <a:p>
+                <a:pPr lvl="0" indent="0" marL="0">
+                  <a:buNone/>
+                </a:pPr>
+                <a:r>
+                  <a:rPr/>
+                  <a:t>L’opération de différenciation peut être répétée plusieurs fois si nécessaire pour obtenir une série encore plus stationnaire, en soustrayant chaque observation par son observation précédente dans la série de différences premières. La série résultante est appelée série de différences d’ordre </a:t>
+                </a:r>
+                <a14:m>
+                  <m:oMath xmlns:m="http://schemas.openxmlformats.org/officeDocument/2006/math">
+                    <m:r>
+                      <m:t>d</m:t>
+                    </m:r>
+                  </m:oMath>
+                </a14:m>
+                <a:r>
+                  <a:rPr/>
+                  <a:t>, où </a:t>
+                </a:r>
+                <a14:m>
+                  <m:oMath xmlns:m="http://schemas.openxmlformats.org/officeDocument/2006/math">
+                    <m:r>
+                      <m:t>d</m:t>
+                    </m:r>
+                  </m:oMath>
+                </a14:m>
+                <a:r>
+                  <a:rPr/>
+                  <a:t> représente le nombre de différences effectuées.</a:t>
+                </a:r>
+              </a:p>
+              <a:p>
+                <a:pPr lvl="0" indent="0" marL="0">
+                  <a:buNone/>
+                </a:pPr>
+                <a:r>
+                  <a:rPr/>
+                  <a:t>Voici un exemple d’équation LaTeX pour représenter la série de différences premières : Cette équation peut être utilisée dans les documents LaTeX pour représenter mathématiquement le concept de différenciation dans l’analyse des séries chronologiques.</a:t>
+                </a:r>
+              </a:p>
+            </p:txBody>
+          </p:sp>
+        </mc:Choice>
+      </mc:AlternateContent>
+    </p:spTree>
+  </p:cSld>
+</p:sld>
+</file>
+
+<file path=ppt/slides/slide32.xml><?xml version="1.0" encoding="utf-8"?>
+<p:sld xmlns:a="http://schemas.openxmlformats.org/drawingml/2006/main" xmlns:r="http://schemas.openxmlformats.org/officeDocument/2006/relationships" xmlns:p="http://schemas.openxmlformats.org/presentationml/2006/main">
+  <p:cSld>
+    <p:spTree>
+      <p:nvGrpSpPr>
+        <p:cNvPr id="1" name=""/>
+        <p:cNvGrpSpPr/>
+        <p:nvPr/>
+      </p:nvGrpSpPr>
+      <p:grpSpPr>
+        <a:xfrm>
+          <a:off x="0" y="0"/>
+          <a:ext cx="0" cy="0"/>
+          <a:chOff x="0" y="0"/>
+          <a:chExt cx="0" cy="0"/>
+        </a:xfrm>
+      </p:grpSpPr>
+      <p:sp>
+        <p:nvSpPr>
+          <p:cNvPr id="2" name="Title 1"/>
+          <p:cNvSpPr>
+            <a:spLocks noGrp="1"/>
+          </p:cNvSpPr>
+          <p:nvPr>
+            <p:ph type="title"/>
+          </p:nvPr>
+        </p:nvSpPr>
+        <p:spPr/>
+        <p:txBody>
+          <a:bodyPr/>
+          <a:lstStyle/>
+          <a:p>
+            <a:pPr lvl="0" indent="0" marL="0">
+              <a:buNone/>
+            </a:pPr>
+            <a:r>
+              <a:rPr/>
+              <a:t>Hypotheses pour les tests de stationnarite</a:t>
+            </a:r>
+          </a:p>
+        </p:txBody>
+      </p:sp>
+      <p:sp>
+        <p:nvSpPr>
+          <p:cNvPr id="3" name="Content Placeholder 2"/>
+          <p:cNvSpPr>
+            <a:spLocks noGrp="1"/>
+          </p:cNvSpPr>
+          <p:nvPr>
+            <p:ph idx="1"/>
+          </p:nvPr>
+        </p:nvSpPr>
+        <p:spPr/>
+        <p:txBody>
+          <a:bodyPr/>
+          <a:lstStyle/>
+          <a:p>
+            <a:pPr lvl="0" indent="0" marL="0">
+              <a:buNone/>
+            </a:pPr>
+            <a:r>
+              <a:rPr/>
+              <a:t>Bien sûr, voici les hypothèses nulles et alternatives pour les tests ADF, KPSS et Phillips-Perron :</a:t>
+            </a:r>
+          </a:p>
+          <a:p>
+            <a:pPr lvl="0" indent="-342900" marL="342900">
+              <a:buAutoNum type="arabicPeriod"/>
+            </a:pPr>
+            <a:r>
+              <a:rPr b="1"/>
+              <a:t>Test de Dickey-Fuller Augmenté (ADF)</a:t>
+            </a:r>
+            <a:r>
+              <a:rPr/>
+              <a:t> :</a:t>
+            </a:r>
+          </a:p>
+          <a:p>
+            <a:pPr lvl="1"/>
+            <a:r>
+              <a:rPr/>
+              <a:t>Hypothèse Nulle (H0) : La série chronologique possède une racine unitaire, ce qui signifie qu’elle n’est pas stationnaire.</a:t>
+            </a:r>
+          </a:p>
+          <a:p>
+            <a:pPr lvl="1"/>
+            <a:r>
+              <a:rPr/>
+              <a:t>Hypothèse Alternative (H1) : La série chronologique ne possède pas de racine unitaire, ce qui signifie qu’elle est stationnaire.</a:t>
+            </a:r>
+          </a:p>
+          <a:p>
+            <a:pPr lvl="0" indent="-342900" marL="342900">
+              <a:buAutoNum type="arabicPeriod"/>
+            </a:pPr>
+            <a:r>
+              <a:rPr b="1"/>
+              <a:t>Test KPSS (Kwiatkowski-Phillips-Schmidt-Shin)</a:t>
+            </a:r>
+            <a:r>
+              <a:rPr/>
+              <a:t> :</a:t>
+            </a:r>
+          </a:p>
+          <a:p>
+            <a:pPr lvl="1"/>
+            <a:r>
+              <a:rPr/>
+              <a:t>Hypothèse Nulle (H0) : La série chronologique est stationnaire.</a:t>
+            </a:r>
+          </a:p>
+          <a:p>
+            <a:pPr lvl="1"/>
+            <a:r>
+              <a:rPr/>
+              <a:t>Hypothèse Alternative (H1) : La série chronologique n’est pas stationnaire.</a:t>
+            </a:r>
+          </a:p>
+          <a:p>
+            <a:pPr lvl="0" indent="-342900" marL="342900">
+              <a:buAutoNum type="arabicPeriod"/>
+            </a:pPr>
+            <a:r>
+              <a:rPr b="1"/>
+              <a:t>Test Phillips-Perron</a:t>
+            </a:r>
+            <a:r>
+              <a:rPr/>
+              <a:t> :</a:t>
+            </a:r>
+          </a:p>
+          <a:p>
+            <a:pPr lvl="1"/>
+            <a:r>
+              <a:rPr/>
+              <a:t>Hypothèse Nulle (H0) : La série chronologique possède une racine unitaire, ce qui signifie qu’elle n’est pas stationnaire.</a:t>
+            </a:r>
+          </a:p>
+          <a:p>
+            <a:pPr lvl="1"/>
+            <a:r>
+              <a:rPr/>
+              <a:t>Hypothèse Alternative (H1) : La série chronologique ne possède pas de racine unitaire, ce qui signifie qu’elle est stationnaire.</a:t>
+            </a:r>
+          </a:p>
+          <a:p>
+            <a:pPr lvl="0" indent="0" marL="0">
+              <a:buNone/>
+            </a:pPr>
+            <a:r>
+              <a:rPr/>
+              <a:t>Il est important de noter que les conclusions des tests dépendent de la p-value associée. Si la p-value est inférieure à un certain seuil (généralement 0,05), on rejette l’hypothèse nulle au profit de l’hypothèse alternative, ce qui signifie que la série est considérée comme stationnaire. Sinon, si la p-value est supérieure au seuil, on ne peut pas rejeter l’hypothèse nulle, ce qui indique que la série n’est pas stationnaire.</a:t>
+            </a:r>
+          </a:p>
+        </p:txBody>
+      </p:sp>
+    </p:spTree>
+  </p:cSld>
+  <p:timing>
+    <p:tnLst>
+      <p:par>
+        <p:cTn id="1" dur="indefinite" restart="never" nodeType="tmRoot">
+          <p:childTnLst>
+            <p:seq concurrent="1" nextAc="seek">
+              <p:cTn id="2" dur="indefinite" nodeType="mainSeq">
+                <p:childTnLst>
+                  <p:par>
+                    <p:cTn id="3" fill="hold">
+                      <p:stCondLst>
+                        <p:cond delay="indefinite"/>
+                      </p:stCondLst>
+                      <p:childTnLst>
+                        <p:par>
+                          <p:cTn id="4" fill="hold">
+                            <p:stCondLst>
+                              <p:cond delay="0"/>
+                            </p:stCondLst>
+                            <p:childTnLst>
+                              <p:par>
+                                <p:cTn id="5" presetID="1" presetClass="entr" presetSubtype="0" fill="hold" grpId="0" nodeType="clickEffect">
+                                  <p:stCondLst>
+                                    <p:cond delay="0"/>
+                                  </p:stCondLst>
+                                  <p:childTnLst>
+                                    <p:set>
+                                      <p:cBhvr>
+                                        <p:cTn id="6" dur="1" fill="hold">
+                                          <p:stCondLst>
+                                            <p:cond delay="0"/>
+                                          </p:stCondLst>
+                                        </p:cTn>
+                                        <p:tgtEl>
+                                          <p:spTgt spid="3">
+                                            <p:txEl>
+                                              <p:pRg st="1" end="1"/>
+                                            </p:txEl>
+                                          </p:spTgt>
+                                        </p:tgtEl>
+                                        <p:attrNameLst>
+                                          <p:attrName>style.visibility</p:attrName>
+                                        </p:attrNameLst>
+                                      </p:cBhvr>
+                                      <p:to>
+                                        <p:strVal val="visible"/>
+                                      </p:to>
+                                    </p:set>
+                                  </p:childTnLst>
+                                </p:cTn>
+                              </p:par>
+                            </p:childTnLst>
+                          </p:cTn>
+                        </p:par>
+                      </p:childTnLst>
+                    </p:cTn>
+                  </p:par>
+                  <p:par>
+                    <p:cTn id="7" fill="hold">
+                      <p:stCondLst>
+                        <p:cond delay="indefinite"/>
+                      </p:stCondLst>
+                      <p:childTnLst>
+                        <p:par>
+                          <p:cTn id="8" fill="hold">
+                            <p:stCondLst>
+                              <p:cond delay="0"/>
+                            </p:stCondLst>
+                            <p:childTnLst>
+                              <p:par>
+                                <p:cTn id="9" presetID="1" presetClass="entr" presetSubtype="0" fill="hold" grpId="0" nodeType="clickEffect">
+                                  <p:stCondLst>
+                                    <p:cond delay="0"/>
+                                  </p:stCondLst>
+                                  <p:childTnLst>
+                                    <p:set>
+                                      <p:cBhvr>
+                                        <p:cTn id="10" dur="1" fill="hold">
+                                          <p:stCondLst>
+                                            <p:cond delay="0"/>
+                                          </p:stCondLst>
+                                        </p:cTn>
+                                        <p:tgtEl>
+                                          <p:spTgt spid="3">
+                                            <p:txEl>
+                                              <p:pRg st="2" end="2"/>
+                                            </p:txEl>
+                                          </p:spTgt>
+                                        </p:tgtEl>
+                                        <p:attrNameLst>
+                                          <p:attrName>style.visibility</p:attrName>
+                                        </p:attrNameLst>
+                                      </p:cBhvr>
+                                      <p:to>
+                                        <p:strVal val="visible"/>
+                                      </p:to>
+                                    </p:set>
+                                  </p:childTnLst>
+                                </p:cTn>
+                              </p:par>
+                            </p:childTnLst>
+                          </p:cTn>
+                        </p:par>
+                      </p:childTnLst>
+                    </p:cTn>
+                  </p:par>
+                  <p:par>
+                    <p:cTn id="11" fill="hold">
+                      <p:stCondLst>
+                        <p:cond delay="indefinite"/>
+                      </p:stCondLst>
+                      <p:childTnLst>
+                        <p:par>
+                          <p:cTn id="12" fill="hold">
+                            <p:stCondLst>
+                              <p:cond delay="0"/>
+                            </p:stCondLst>
+                            <p:childTnLst>
+                              <p:par>
+                                <p:cTn id="13" presetID="1" presetClass="entr" presetSubtype="0" fill="hold" grpId="0" nodeType="clickEffect">
+                                  <p:stCondLst>
+                                    <p:cond delay="0"/>
+                                  </p:stCondLst>
+                                  <p:childTnLst>
+                                    <p:set>
+                                      <p:cBhvr>
+                                        <p:cTn id="14" dur="1" fill="hold">
+                                          <p:stCondLst>
+                                            <p:cond delay="0"/>
+                                          </p:stCondLst>
+                                        </p:cTn>
+                                        <p:tgtEl>
+                                          <p:spTgt spid="3">
+                                            <p:txEl>
+                                              <p:pRg st="3" end="3"/>
+                                            </p:txEl>
+                                          </p:spTgt>
+                                        </p:tgtEl>
+                                        <p:attrNameLst>
+                                          <p:attrName>style.visibility</p:attrName>
+                                        </p:attrNameLst>
+                                      </p:cBhvr>
+                                      <p:to>
+                                        <p:strVal val="visible"/>
+                                      </p:to>
+                                    </p:set>
+                                  </p:childTnLst>
+                                </p:cTn>
+                              </p:par>
+                            </p:childTnLst>
+                          </p:cTn>
+                        </p:par>
+                      </p:childTnLst>
+                    </p:cTn>
+                  </p:par>
+                  <p:par>
+                    <p:cTn id="15" fill="hold">
+                      <p:stCondLst>
+                        <p:cond delay="indefinite"/>
+                      </p:stCondLst>
+                      <p:childTnLst>
+                        <p:par>
+                          <p:cTn id="16" fill="hold">
+                            <p:stCondLst>
+                              <p:cond delay="0"/>
+                            </p:stCondLst>
+                            <p:childTnLst>
+                              <p:par>
+                                <p:cTn id="17" presetID="1" presetClass="entr" presetSubtype="0" fill="hold" grpId="0" nodeType="clickEffect">
+                                  <p:stCondLst>
+                                    <p:cond delay="0"/>
+                                  </p:stCondLst>
+                                  <p:childTnLst>
+                                    <p:set>
+                                      <p:cBhvr>
+                                        <p:cTn id="18" dur="1" fill="hold">
+                                          <p:stCondLst>
+                                            <p:cond delay="0"/>
+                                          </p:stCondLst>
+                                        </p:cTn>
+                                        <p:tgtEl>
+                                          <p:spTgt spid="3">
+                                            <p:txEl>
+                                              <p:pRg st="4" end="4"/>
+                                            </p:txEl>
+                                          </p:spTgt>
+                                        </p:tgtEl>
+                                        <p:attrNameLst>
+                                          <p:attrName>style.visibility</p:attrName>
+                                        </p:attrNameLst>
+                                      </p:cBhvr>
+                                      <p:to>
+                                        <p:strVal val="visible"/>
+                                      </p:to>
+                                    </p:set>
+                                  </p:childTnLst>
+                                </p:cTn>
+                              </p:par>
+                            </p:childTnLst>
+                          </p:cTn>
+                        </p:par>
+                      </p:childTnLst>
+                    </p:cTn>
+                  </p:par>
+                  <p:par>
+                    <p:cTn id="19" fill="hold">
+                      <p:stCondLst>
+                        <p:cond delay="indefinite"/>
+                      </p:stCondLst>
+                      <p:childTnLst>
+                        <p:par>
+                          <p:cTn id="20" fill="hold">
+                            <p:stCondLst>
+                              <p:cond delay="0"/>
+                            </p:stCondLst>
+                            <p:childTnLst>
+                              <p:par>
+                                <p:cTn id="21" presetID="1" presetClass="entr" presetSubtype="0" fill="hold" grpId="0" nodeType="clickEffect">
+                                  <p:stCondLst>
+                                    <p:cond delay="0"/>
+                                  </p:stCondLst>
+                                  <p:childTnLst>
+                                    <p:set>
+                                      <p:cBhvr>
+                                        <p:cTn id="22" dur="1" fill="hold">
+                                          <p:stCondLst>
+                                            <p:cond delay="0"/>
+                                          </p:stCondLst>
+                                        </p:cTn>
+                                        <p:tgtEl>
+                                          <p:spTgt spid="3">
+                                            <p:txEl>
+                                              <p:pRg st="5" end="5"/>
+                                            </p:txEl>
+                                          </p:spTgt>
+                                        </p:tgtEl>
+                                        <p:attrNameLst>
+                                          <p:attrName>style.visibility</p:attrName>
+                                        </p:attrNameLst>
+                                      </p:cBhvr>
+                                      <p:to>
+                                        <p:strVal val="visible"/>
+                                      </p:to>
+                                    </p:set>
+                                  </p:childTnLst>
+                                </p:cTn>
+                              </p:par>
+                            </p:childTnLst>
+                          </p:cTn>
+                        </p:par>
+                      </p:childTnLst>
+                    </p:cTn>
+                  </p:par>
+                  <p:par>
+                    <p:cTn id="23" fill="hold">
+                      <p:stCondLst>
+                        <p:cond delay="indefinite"/>
+                      </p:stCondLst>
+                      <p:childTnLst>
+                        <p:par>
+                          <p:cTn id="24" fill="hold">
+                            <p:stCondLst>
+                              <p:cond delay="0"/>
+                            </p:stCondLst>
+                            <p:childTnLst>
+                              <p:par>
+                                <p:cTn id="25" presetID="1" presetClass="entr" presetSubtype="0" fill="hold" grpId="0" nodeType="clickEffect">
+                                  <p:stCondLst>
+                                    <p:cond delay="0"/>
+                                  </p:stCondLst>
+                                  <p:childTnLst>
+                                    <p:set>
+                                      <p:cBhvr>
+                                        <p:cTn id="26" dur="1" fill="hold">
+                                          <p:stCondLst>
+                                            <p:cond delay="0"/>
+                                          </p:stCondLst>
+                                        </p:cTn>
+                                        <p:tgtEl>
+                                          <p:spTgt spid="3">
+                                            <p:txEl>
+                                              <p:pRg st="6" end="6"/>
+                                            </p:txEl>
+                                          </p:spTgt>
+                                        </p:tgtEl>
+                                        <p:attrNameLst>
+                                          <p:attrName>style.visibility</p:attrName>
+                                        </p:attrNameLst>
+                                      </p:cBhvr>
+                                      <p:to>
+                                        <p:strVal val="visible"/>
+                                      </p:to>
+                                    </p:set>
+                                  </p:childTnLst>
+                                </p:cTn>
+                              </p:par>
+                            </p:childTnLst>
+                          </p:cTn>
+                        </p:par>
+                      </p:childTnLst>
+                    </p:cTn>
+                  </p:par>
+                  <p:par>
+                    <p:cTn id="27" fill="hold">
+                      <p:stCondLst>
+                        <p:cond delay="indefinite"/>
+                      </p:stCondLst>
+                      <p:childTnLst>
+                        <p:par>
+                          <p:cTn id="28" fill="hold">
+                            <p:stCondLst>
+                              <p:cond delay="0"/>
+                            </p:stCondLst>
+                            <p:childTnLst>
+                              <p:par>
+                                <p:cTn id="29" presetID="1" presetClass="entr" presetSubtype="0" fill="hold" grpId="0" nodeType="clickEffect">
+                                  <p:stCondLst>
+                                    <p:cond delay="0"/>
+                                  </p:stCondLst>
+                                  <p:childTnLst>
+                                    <p:set>
+                                      <p:cBhvr>
+                                        <p:cTn id="30" dur="1" fill="hold">
+                                          <p:stCondLst>
+                                            <p:cond delay="0"/>
+                                          </p:stCondLst>
+                                        </p:cTn>
+                                        <p:tgtEl>
+                                          <p:spTgt spid="3">
+                                            <p:txEl>
+                                              <p:pRg st="7" end="7"/>
+                                            </p:txEl>
+                                          </p:spTgt>
+                                        </p:tgtEl>
+                                        <p:attrNameLst>
+                                          <p:attrName>style.visibility</p:attrName>
+                                        </p:attrNameLst>
+                                      </p:cBhvr>
+                                      <p:to>
+                                        <p:strVal val="visible"/>
+                                      </p:to>
+                                    </p:set>
+                                  </p:childTnLst>
+                                </p:cTn>
+                              </p:par>
+                            </p:childTnLst>
+                          </p:cTn>
+                        </p:par>
+                      </p:childTnLst>
+                    </p:cTn>
+                  </p:par>
+                  <p:par>
+                    <p:cTn id="31" fill="hold">
+                      <p:stCondLst>
+                        <p:cond delay="indefinite"/>
+                      </p:stCondLst>
+                      <p:childTnLst>
+                        <p:par>
+                          <p:cTn id="32" fill="hold">
+                            <p:stCondLst>
+                              <p:cond delay="0"/>
+                            </p:stCondLst>
+                            <p:childTnLst>
+                              <p:par>
+                                <p:cTn id="33" presetID="1" presetClass="entr" presetSubtype="0" fill="hold" grpId="0" nodeType="clickEffect">
+                                  <p:stCondLst>
+                                    <p:cond delay="0"/>
+                                  </p:stCondLst>
+                                  <p:childTnLst>
+                                    <p:set>
+                                      <p:cBhvr>
+                                        <p:cTn id="34" dur="1" fill="hold">
+                                          <p:stCondLst>
+                                            <p:cond delay="0"/>
+                                          </p:stCondLst>
+                                        </p:cTn>
+                                        <p:tgtEl>
+                                          <p:spTgt spid="3">
+                                            <p:txEl>
+                                              <p:pRg st="8" end="8"/>
+                                            </p:txEl>
+                                          </p:spTgt>
+                                        </p:tgtEl>
+                                        <p:attrNameLst>
+                                          <p:attrName>style.visibility</p:attrName>
+                                        </p:attrNameLst>
+                                      </p:cBhvr>
+                                      <p:to>
+                                        <p:strVal val="visible"/>
+                                      </p:to>
+                                    </p:set>
+                                  </p:childTnLst>
+                                </p:cTn>
+                              </p:par>
+                            </p:childTnLst>
+                          </p:cTn>
+                        </p:par>
+                      </p:childTnLst>
+                    </p:cTn>
+                  </p:par>
+                  <p:par>
+                    <p:cTn id="35" fill="hold">
+                      <p:stCondLst>
+                        <p:cond delay="indefinite"/>
+                      </p:stCondLst>
+                      <p:childTnLst>
+                        <p:par>
+                          <p:cTn id="36" fill="hold">
+                            <p:stCondLst>
+                              <p:cond delay="0"/>
+                            </p:stCondLst>
+                            <p:childTnLst>
+                              <p:par>
+                                <p:cTn id="37" presetID="1" presetClass="entr" presetSubtype="0" fill="hold" grpId="0" nodeType="clickEffect">
+                                  <p:stCondLst>
+                                    <p:cond delay="0"/>
+                                  </p:stCondLst>
+                                  <p:childTnLst>
+                                    <p:set>
+                                      <p:cBhvr>
+                                        <p:cTn id="38" dur="1" fill="hold">
+                                          <p:stCondLst>
+                                            <p:cond delay="0"/>
+                                          </p:stCondLst>
+                                        </p:cTn>
+                                        <p:tgtEl>
+                                          <p:spTgt spid="3">
+                                            <p:txEl>
+                                              <p:pRg st="9" end="9"/>
+                                            </p:txEl>
+                                          </p:spTgt>
+                                        </p:tgtEl>
+                                        <p:attrNameLst>
+                                          <p:attrName>style.visibility</p:attrName>
+                                        </p:attrNameLst>
+                                      </p:cBhvr>
+                                      <p:to>
+                                        <p:strVal val="visible"/>
+                                      </p:to>
+                                    </p:set>
+                                  </p:childTnLst>
+                                </p:cTn>
+                              </p:par>
+                            </p:childTnLst>
+                          </p:cTn>
+                        </p:par>
+                      </p:childTnLst>
+                    </p:cTn>
+                  </p:par>
+                </p:childTnLst>
+              </p:cTn>
+              <p:prevCondLst>
+                <p:cond evt="onPrev" delay="0">
+                  <p:tgtEl>
+                    <p:sldTgt/>
+                  </p:tgtEl>
+                </p:cond>
+              </p:prevCondLst>
+              <p:nextCondLst>
+                <p:cond evt="onNext" delay="0">
+                  <p:tgtEl>
+                    <p:sldTgt/>
+                  </p:tgtEl>
+                </p:cond>
+              </p:nextCondLst>
+            </p:seq>
+          </p:childTnLst>
+        </p:cTn>
+      </p:par>
+    </p:tnLst>
+    <p:bldLst>
+      <p:bldP spid="3" grpId="0" uiExpand="1" build="p"/>
+    </p:bldLst>
+  </p:timing>
+</p:sld>
+</file>
+
+<file path=ppt/slides/slide33.xml><?xml version="1.0" encoding="utf-8"?>
+<p:sld xmlns:a="http://schemas.openxmlformats.org/drawingml/2006/main" xmlns:r="http://schemas.openxmlformats.org/officeDocument/2006/relationships" xmlns:p="http://schemas.openxmlformats.org/presentationml/2006/main">
+  <p:cSld>
+    <p:spTree>
+      <p:nvGrpSpPr>
+        <p:cNvPr id="1" name=""/>
+        <p:cNvGrpSpPr/>
+        <p:nvPr/>
+      </p:nvGrpSpPr>
+      <p:grpSpPr>
+        <a:xfrm>
+          <a:off x="0" y="0"/>
+          <a:ext cx="0" cy="0"/>
+          <a:chOff x="0" y="0"/>
+          <a:chExt cx="0" cy="0"/>
+        </a:xfrm>
+      </p:grpSpPr>
+      <p:sp>
+        <p:nvSpPr>
+          <p:cNvPr id="2" name="Title 1"/>
+          <p:cNvSpPr>
+            <a:spLocks noGrp="1"/>
+          </p:cNvSpPr>
+          <p:nvPr>
+            <p:ph type="title"/>
+          </p:nvPr>
+        </p:nvSpPr>
+        <p:spPr/>
+        <p:txBody>
+          <a:bodyPr/>
+          <a:lstStyle/>
+          <a:p>
+            <a:pPr lvl="0" indent="0" marL="0">
+              <a:buNone/>
+            </a:pPr>
+            <a:r>
+              <a:rPr/>
+              <a:t>Tableau Presentant les resultats des tests de stationnarite</a:t>
+            </a:r>
+          </a:p>
+        </p:txBody>
+      </p:sp>
+      <p:pic>
+        <p:nvPicPr>
+          <p:cNvPr descr="./outputs/res_stationarity.png" id="0" name="Picture 1"/>
+          <p:cNvPicPr>
+            <a:picLocks noGrp="1" noChangeAspect="1"/>
+          </p:cNvPicPr>
+          <p:nvPr/>
+        </p:nvPicPr>
+        <p:blipFill>
+          <a:blip r:embed="rId2"/>
+          <a:stretch>
+            <a:fillRect/>
+          </a:stretch>
+        </p:blipFill>
+        <p:spPr bwMode="auto">
+          <a:xfrm>
+            <a:off x="1003300" y="1193800"/>
+            <a:ext cx="7124700" cy="3390900"/>
+          </a:xfrm>
+          <a:prstGeom prst="rect">
+            <a:avLst/>
+          </a:prstGeom>
+          <a:noFill/>
+          <a:ln w="9525">
+            <a:noFill/>
+            <a:headEnd/>
+            <a:tailEnd/>
+          </a:ln>
+        </p:spPr>
+      </p:pic>
     </p:spTree>
   </p:cSld>
 </p:sld>

</xml_diff>